<commit_message>
modified:   TARS Instructions (WIP).pptx
</commit_message>
<xml_diff>
--- a/TARS Instructions (WIP).pptx
+++ b/TARS Instructions (WIP).pptx
@@ -5,7 +5,7 @@
     <p:sldMasterId id="2147483648" r:id="rId1"/>
   </p:sldMasterIdLst>
   <p:notesMasterIdLst>
-    <p:notesMasterId r:id="rId15"/>
+    <p:notesMasterId r:id="rId23"/>
   </p:notesMasterIdLst>
   <p:sldIdLst>
     <p:sldId id="256" r:id="rId2"/>
@@ -19,8 +19,16 @@
     <p:sldId id="270" r:id="rId10"/>
     <p:sldId id="271" r:id="rId11"/>
     <p:sldId id="263" r:id="rId12"/>
-    <p:sldId id="264" r:id="rId13"/>
-    <p:sldId id="265" r:id="rId14"/>
+    <p:sldId id="273" r:id="rId13"/>
+    <p:sldId id="264" r:id="rId14"/>
+    <p:sldId id="265" r:id="rId15"/>
+    <p:sldId id="275" r:id="rId16"/>
+    <p:sldId id="274" r:id="rId17"/>
+    <p:sldId id="276" r:id="rId18"/>
+    <p:sldId id="277" r:id="rId19"/>
+    <p:sldId id="278" r:id="rId20"/>
+    <p:sldId id="279" r:id="rId21"/>
+    <p:sldId id="280" r:id="rId22"/>
   </p:sldIdLst>
   <p:sldSz cx="12192000" cy="6858000"/>
   <p:notesSz cx="6858000" cy="9144000"/>
@@ -568,6 +576,114 @@
         <p:cNvPr id="1" name="">
           <a:extLst>
             <a:ext uri="{FF2B5EF4-FFF2-40B4-BE49-F238E27FC236}">
+              <a16:creationId xmlns:a16="http://schemas.microsoft.com/office/drawing/2014/main" id="{84C3E7E2-C964-FF17-0C4B-1D2E3E26CE62}"/>
+            </a:ext>
+          </a:extLst>
+        </p:cNvPr>
+        <p:cNvGrpSpPr/>
+        <p:nvPr/>
+      </p:nvGrpSpPr>
+      <p:grpSpPr>
+        <a:xfrm>
+          <a:off x="0" y="0"/>
+          <a:ext cx="0" cy="0"/>
+          <a:chOff x="0" y="0"/>
+          <a:chExt cx="0" cy="0"/>
+        </a:xfrm>
+      </p:grpSpPr>
+      <p:sp>
+        <p:nvSpPr>
+          <p:cNvPr id="2" name="Slide Image Placeholder 1">
+            <a:extLst>
+              <a:ext uri="{FF2B5EF4-FFF2-40B4-BE49-F238E27FC236}">
+                <a16:creationId xmlns:a16="http://schemas.microsoft.com/office/drawing/2014/main" id="{D2CCA3AF-0B50-01F9-17FC-0CFCDDCB407E}"/>
+              </a:ext>
+            </a:extLst>
+          </p:cNvPr>
+          <p:cNvSpPr>
+            <a:spLocks noGrp="1" noRot="1" noChangeAspect="1"/>
+          </p:cNvSpPr>
+          <p:nvPr>
+            <p:ph type="sldImg"/>
+          </p:nvPr>
+        </p:nvSpPr>
+        <p:spPr/>
+      </p:sp>
+      <p:sp>
+        <p:nvSpPr>
+          <p:cNvPr id="3" name="Notes Placeholder 2">
+            <a:extLst>
+              <a:ext uri="{FF2B5EF4-FFF2-40B4-BE49-F238E27FC236}">
+                <a16:creationId xmlns:a16="http://schemas.microsoft.com/office/drawing/2014/main" id="{10E79EA1-67D2-76DD-F1A2-A4A2A153C482}"/>
+              </a:ext>
+            </a:extLst>
+          </p:cNvPr>
+          <p:cNvSpPr>
+            <a:spLocks noGrp="1"/>
+          </p:cNvSpPr>
+          <p:nvPr>
+            <p:ph type="body" idx="1"/>
+          </p:nvPr>
+        </p:nvSpPr>
+        <p:spPr/>
+        <p:txBody>
+          <a:bodyPr/>
+          <a:lstStyle/>
+          <a:p>
+            <a:endParaRPr lang="en-US" dirty="0"/>
+          </a:p>
+        </p:txBody>
+      </p:sp>
+      <p:sp>
+        <p:nvSpPr>
+          <p:cNvPr id="4" name="Slide Number Placeholder 3">
+            <a:extLst>
+              <a:ext uri="{FF2B5EF4-FFF2-40B4-BE49-F238E27FC236}">
+                <a16:creationId xmlns:a16="http://schemas.microsoft.com/office/drawing/2014/main" id="{C9C97CD3-FA8D-86BC-4BF6-99FFCE12C0E5}"/>
+              </a:ext>
+            </a:extLst>
+          </p:cNvPr>
+          <p:cNvSpPr>
+            <a:spLocks noGrp="1"/>
+          </p:cNvSpPr>
+          <p:nvPr>
+            <p:ph type="sldNum" sz="quarter" idx="5"/>
+          </p:nvPr>
+        </p:nvSpPr>
+        <p:spPr/>
+        <p:txBody>
+          <a:bodyPr/>
+          <a:lstStyle/>
+          <a:p>
+            <a:fld id="{4F9FBC38-293A-4128-8897-DC4F2AE6DC9E}" type="slidenum">
+              <a:rPr lang="en-US" smtClean="0"/>
+              <a:t>12</a:t>
+            </a:fld>
+            <a:endParaRPr lang="en-US"/>
+          </a:p>
+        </p:txBody>
+      </p:sp>
+    </p:spTree>
+    <p:extLst>
+      <p:ext uri="{BB962C8B-B14F-4D97-AF65-F5344CB8AC3E}">
+        <p14:creationId xmlns:p14="http://schemas.microsoft.com/office/powerpoint/2010/main" val="1307745206"/>
+      </p:ext>
+    </p:extLst>
+  </p:cSld>
+  <p:clrMapOvr>
+    <a:masterClrMapping/>
+  </p:clrMapOvr>
+</p:notes>
+</file>
+
+<file path=ppt/notesSlides/notesSlide11.xml><?xml version="1.0" encoding="utf-8"?>
+<p:notes xmlns:a="http://schemas.openxmlformats.org/drawingml/2006/main" xmlns:r="http://schemas.openxmlformats.org/officeDocument/2006/relationships" xmlns:p="http://schemas.openxmlformats.org/presentationml/2006/main">
+  <p:cSld>
+    <p:spTree>
+      <p:nvGrpSpPr>
+        <p:cNvPr id="1" name="">
+          <a:extLst>
+            <a:ext uri="{FF2B5EF4-FFF2-40B4-BE49-F238E27FC236}">
               <a16:creationId xmlns:a16="http://schemas.microsoft.com/office/drawing/2014/main" id="{83B0FD85-D835-411A-3B7D-72A1BDE1CA1E}"/>
             </a:ext>
           </a:extLst>
@@ -649,7 +765,7 @@
           <a:p>
             <a:fld id="{4F9FBC38-293A-4128-8897-DC4F2AE6DC9E}" type="slidenum">
               <a:rPr lang="en-US" smtClean="0"/>
-              <a:t>12</a:t>
+              <a:t>13</a:t>
             </a:fld>
             <a:endParaRPr lang="en-US"/>
           </a:p>
@@ -668,7 +784,7 @@
 </p:notes>
 </file>
 
-<file path=ppt/notesSlides/notesSlide11.xml><?xml version="1.0" encoding="utf-8"?>
+<file path=ppt/notesSlides/notesSlide12.xml><?xml version="1.0" encoding="utf-8"?>
 <p:notes xmlns:a="http://schemas.openxmlformats.org/drawingml/2006/main" xmlns:r="http://schemas.openxmlformats.org/officeDocument/2006/relationships" xmlns:p="http://schemas.openxmlformats.org/presentationml/2006/main">
   <p:cSld>
     <p:spTree>
@@ -757,7 +873,7 @@
           <a:p>
             <a:fld id="{4F9FBC38-293A-4128-8897-DC4F2AE6DC9E}" type="slidenum">
               <a:rPr lang="en-US" smtClean="0"/>
-              <a:t>13</a:t>
+              <a:t>14</a:t>
             </a:fld>
             <a:endParaRPr lang="en-US"/>
           </a:p>
@@ -767,6 +883,762 @@
     <p:extLst>
       <p:ext uri="{BB962C8B-B14F-4D97-AF65-F5344CB8AC3E}">
         <p14:creationId xmlns:p14="http://schemas.microsoft.com/office/powerpoint/2010/main" val="2658814446"/>
+      </p:ext>
+    </p:extLst>
+  </p:cSld>
+  <p:clrMapOvr>
+    <a:masterClrMapping/>
+  </p:clrMapOvr>
+</p:notes>
+</file>
+
+<file path=ppt/notesSlides/notesSlide13.xml><?xml version="1.0" encoding="utf-8"?>
+<p:notes xmlns:a="http://schemas.openxmlformats.org/drawingml/2006/main" xmlns:r="http://schemas.openxmlformats.org/officeDocument/2006/relationships" xmlns:p="http://schemas.openxmlformats.org/presentationml/2006/main">
+  <p:cSld>
+    <p:spTree>
+      <p:nvGrpSpPr>
+        <p:cNvPr id="1" name="">
+          <a:extLst>
+            <a:ext uri="{FF2B5EF4-FFF2-40B4-BE49-F238E27FC236}">
+              <a16:creationId xmlns:a16="http://schemas.microsoft.com/office/drawing/2014/main" id="{8850D0C2-AEC7-BAEA-E85A-9ABF217019F8}"/>
+            </a:ext>
+          </a:extLst>
+        </p:cNvPr>
+        <p:cNvGrpSpPr/>
+        <p:nvPr/>
+      </p:nvGrpSpPr>
+      <p:grpSpPr>
+        <a:xfrm>
+          <a:off x="0" y="0"/>
+          <a:ext cx="0" cy="0"/>
+          <a:chOff x="0" y="0"/>
+          <a:chExt cx="0" cy="0"/>
+        </a:xfrm>
+      </p:grpSpPr>
+      <p:sp>
+        <p:nvSpPr>
+          <p:cNvPr id="2" name="Slide Image Placeholder 1">
+            <a:extLst>
+              <a:ext uri="{FF2B5EF4-FFF2-40B4-BE49-F238E27FC236}">
+                <a16:creationId xmlns:a16="http://schemas.microsoft.com/office/drawing/2014/main" id="{48620084-3EC7-485C-9921-BF5A3C0FFC6E}"/>
+              </a:ext>
+            </a:extLst>
+          </p:cNvPr>
+          <p:cNvSpPr>
+            <a:spLocks noGrp="1" noRot="1" noChangeAspect="1"/>
+          </p:cNvSpPr>
+          <p:nvPr>
+            <p:ph type="sldImg"/>
+          </p:nvPr>
+        </p:nvSpPr>
+        <p:spPr/>
+      </p:sp>
+      <p:sp>
+        <p:nvSpPr>
+          <p:cNvPr id="3" name="Notes Placeholder 2">
+            <a:extLst>
+              <a:ext uri="{FF2B5EF4-FFF2-40B4-BE49-F238E27FC236}">
+                <a16:creationId xmlns:a16="http://schemas.microsoft.com/office/drawing/2014/main" id="{84659CD8-B910-26C5-8917-221EC844B964}"/>
+              </a:ext>
+            </a:extLst>
+          </p:cNvPr>
+          <p:cNvSpPr>
+            <a:spLocks noGrp="1"/>
+          </p:cNvSpPr>
+          <p:nvPr>
+            <p:ph type="body" idx="1"/>
+          </p:nvPr>
+        </p:nvSpPr>
+        <p:spPr/>
+        <p:txBody>
+          <a:bodyPr/>
+          <a:lstStyle/>
+          <a:p>
+            <a:endParaRPr lang="en-US" dirty="0"/>
+          </a:p>
+        </p:txBody>
+      </p:sp>
+      <p:sp>
+        <p:nvSpPr>
+          <p:cNvPr id="4" name="Slide Number Placeholder 3">
+            <a:extLst>
+              <a:ext uri="{FF2B5EF4-FFF2-40B4-BE49-F238E27FC236}">
+                <a16:creationId xmlns:a16="http://schemas.microsoft.com/office/drawing/2014/main" id="{D4F5C175-FCDC-8F34-9E51-0540ABB214F7}"/>
+              </a:ext>
+            </a:extLst>
+          </p:cNvPr>
+          <p:cNvSpPr>
+            <a:spLocks noGrp="1"/>
+          </p:cNvSpPr>
+          <p:nvPr>
+            <p:ph type="sldNum" sz="quarter" idx="5"/>
+          </p:nvPr>
+        </p:nvSpPr>
+        <p:spPr/>
+        <p:txBody>
+          <a:bodyPr/>
+          <a:lstStyle/>
+          <a:p>
+            <a:fld id="{4F9FBC38-293A-4128-8897-DC4F2AE6DC9E}" type="slidenum">
+              <a:rPr lang="en-US" smtClean="0"/>
+              <a:t>15</a:t>
+            </a:fld>
+            <a:endParaRPr lang="en-US"/>
+          </a:p>
+        </p:txBody>
+      </p:sp>
+    </p:spTree>
+    <p:extLst>
+      <p:ext uri="{BB962C8B-B14F-4D97-AF65-F5344CB8AC3E}">
+        <p14:creationId xmlns:p14="http://schemas.microsoft.com/office/powerpoint/2010/main" val="3053102624"/>
+      </p:ext>
+    </p:extLst>
+  </p:cSld>
+  <p:clrMapOvr>
+    <a:masterClrMapping/>
+  </p:clrMapOvr>
+</p:notes>
+</file>
+
+<file path=ppt/notesSlides/notesSlide14.xml><?xml version="1.0" encoding="utf-8"?>
+<p:notes xmlns:a="http://schemas.openxmlformats.org/drawingml/2006/main" xmlns:r="http://schemas.openxmlformats.org/officeDocument/2006/relationships" xmlns:p="http://schemas.openxmlformats.org/presentationml/2006/main">
+  <p:cSld>
+    <p:spTree>
+      <p:nvGrpSpPr>
+        <p:cNvPr id="1" name="">
+          <a:extLst>
+            <a:ext uri="{FF2B5EF4-FFF2-40B4-BE49-F238E27FC236}">
+              <a16:creationId xmlns:a16="http://schemas.microsoft.com/office/drawing/2014/main" id="{ED62941E-51A3-400E-EDDC-9A81F832BDB1}"/>
+            </a:ext>
+          </a:extLst>
+        </p:cNvPr>
+        <p:cNvGrpSpPr/>
+        <p:nvPr/>
+      </p:nvGrpSpPr>
+      <p:grpSpPr>
+        <a:xfrm>
+          <a:off x="0" y="0"/>
+          <a:ext cx="0" cy="0"/>
+          <a:chOff x="0" y="0"/>
+          <a:chExt cx="0" cy="0"/>
+        </a:xfrm>
+      </p:grpSpPr>
+      <p:sp>
+        <p:nvSpPr>
+          <p:cNvPr id="2" name="Slide Image Placeholder 1">
+            <a:extLst>
+              <a:ext uri="{FF2B5EF4-FFF2-40B4-BE49-F238E27FC236}">
+                <a16:creationId xmlns:a16="http://schemas.microsoft.com/office/drawing/2014/main" id="{F45D555C-B4A7-6EE7-8EAB-08B98F425C41}"/>
+              </a:ext>
+            </a:extLst>
+          </p:cNvPr>
+          <p:cNvSpPr>
+            <a:spLocks noGrp="1" noRot="1" noChangeAspect="1"/>
+          </p:cNvSpPr>
+          <p:nvPr>
+            <p:ph type="sldImg"/>
+          </p:nvPr>
+        </p:nvSpPr>
+        <p:spPr/>
+      </p:sp>
+      <p:sp>
+        <p:nvSpPr>
+          <p:cNvPr id="3" name="Notes Placeholder 2">
+            <a:extLst>
+              <a:ext uri="{FF2B5EF4-FFF2-40B4-BE49-F238E27FC236}">
+                <a16:creationId xmlns:a16="http://schemas.microsoft.com/office/drawing/2014/main" id="{DAC96480-BD4E-82EB-E400-B9F1C13796CF}"/>
+              </a:ext>
+            </a:extLst>
+          </p:cNvPr>
+          <p:cNvSpPr>
+            <a:spLocks noGrp="1"/>
+          </p:cNvSpPr>
+          <p:nvPr>
+            <p:ph type="body" idx="1"/>
+          </p:nvPr>
+        </p:nvSpPr>
+        <p:spPr/>
+        <p:txBody>
+          <a:bodyPr/>
+          <a:lstStyle/>
+          <a:p>
+            <a:endParaRPr lang="en-US" dirty="0"/>
+          </a:p>
+        </p:txBody>
+      </p:sp>
+      <p:sp>
+        <p:nvSpPr>
+          <p:cNvPr id="4" name="Slide Number Placeholder 3">
+            <a:extLst>
+              <a:ext uri="{FF2B5EF4-FFF2-40B4-BE49-F238E27FC236}">
+                <a16:creationId xmlns:a16="http://schemas.microsoft.com/office/drawing/2014/main" id="{3B324071-137F-9E24-8DD4-0E5A7AD11C19}"/>
+              </a:ext>
+            </a:extLst>
+          </p:cNvPr>
+          <p:cNvSpPr>
+            <a:spLocks noGrp="1"/>
+          </p:cNvSpPr>
+          <p:nvPr>
+            <p:ph type="sldNum" sz="quarter" idx="5"/>
+          </p:nvPr>
+        </p:nvSpPr>
+        <p:spPr/>
+        <p:txBody>
+          <a:bodyPr/>
+          <a:lstStyle/>
+          <a:p>
+            <a:fld id="{4F9FBC38-293A-4128-8897-DC4F2AE6DC9E}" type="slidenum">
+              <a:rPr lang="en-US" smtClean="0"/>
+              <a:t>16</a:t>
+            </a:fld>
+            <a:endParaRPr lang="en-US"/>
+          </a:p>
+        </p:txBody>
+      </p:sp>
+    </p:spTree>
+    <p:extLst>
+      <p:ext uri="{BB962C8B-B14F-4D97-AF65-F5344CB8AC3E}">
+        <p14:creationId xmlns:p14="http://schemas.microsoft.com/office/powerpoint/2010/main" val="2941340930"/>
+      </p:ext>
+    </p:extLst>
+  </p:cSld>
+  <p:clrMapOvr>
+    <a:masterClrMapping/>
+  </p:clrMapOvr>
+</p:notes>
+</file>
+
+<file path=ppt/notesSlides/notesSlide15.xml><?xml version="1.0" encoding="utf-8"?>
+<p:notes xmlns:a="http://schemas.openxmlformats.org/drawingml/2006/main" xmlns:r="http://schemas.openxmlformats.org/officeDocument/2006/relationships" xmlns:p="http://schemas.openxmlformats.org/presentationml/2006/main">
+  <p:cSld>
+    <p:spTree>
+      <p:nvGrpSpPr>
+        <p:cNvPr id="1" name="">
+          <a:extLst>
+            <a:ext uri="{FF2B5EF4-FFF2-40B4-BE49-F238E27FC236}">
+              <a16:creationId xmlns:a16="http://schemas.microsoft.com/office/drawing/2014/main" id="{5B36D138-9C3E-DACA-A2AF-DA33349166F2}"/>
+            </a:ext>
+          </a:extLst>
+        </p:cNvPr>
+        <p:cNvGrpSpPr/>
+        <p:nvPr/>
+      </p:nvGrpSpPr>
+      <p:grpSpPr>
+        <a:xfrm>
+          <a:off x="0" y="0"/>
+          <a:ext cx="0" cy="0"/>
+          <a:chOff x="0" y="0"/>
+          <a:chExt cx="0" cy="0"/>
+        </a:xfrm>
+      </p:grpSpPr>
+      <p:sp>
+        <p:nvSpPr>
+          <p:cNvPr id="2" name="Slide Image Placeholder 1">
+            <a:extLst>
+              <a:ext uri="{FF2B5EF4-FFF2-40B4-BE49-F238E27FC236}">
+                <a16:creationId xmlns:a16="http://schemas.microsoft.com/office/drawing/2014/main" id="{94647BC4-8544-E7DF-4C9B-5E5B8FD9460E}"/>
+              </a:ext>
+            </a:extLst>
+          </p:cNvPr>
+          <p:cNvSpPr>
+            <a:spLocks noGrp="1" noRot="1" noChangeAspect="1"/>
+          </p:cNvSpPr>
+          <p:nvPr>
+            <p:ph type="sldImg"/>
+          </p:nvPr>
+        </p:nvSpPr>
+        <p:spPr/>
+      </p:sp>
+      <p:sp>
+        <p:nvSpPr>
+          <p:cNvPr id="3" name="Notes Placeholder 2">
+            <a:extLst>
+              <a:ext uri="{FF2B5EF4-FFF2-40B4-BE49-F238E27FC236}">
+                <a16:creationId xmlns:a16="http://schemas.microsoft.com/office/drawing/2014/main" id="{9525BC0B-A86F-1A22-1FB4-5A1E1913B92F}"/>
+              </a:ext>
+            </a:extLst>
+          </p:cNvPr>
+          <p:cNvSpPr>
+            <a:spLocks noGrp="1"/>
+          </p:cNvSpPr>
+          <p:nvPr>
+            <p:ph type="body" idx="1"/>
+          </p:nvPr>
+        </p:nvSpPr>
+        <p:spPr/>
+        <p:txBody>
+          <a:bodyPr/>
+          <a:lstStyle/>
+          <a:p>
+            <a:endParaRPr lang="en-US" dirty="0"/>
+          </a:p>
+        </p:txBody>
+      </p:sp>
+      <p:sp>
+        <p:nvSpPr>
+          <p:cNvPr id="4" name="Slide Number Placeholder 3">
+            <a:extLst>
+              <a:ext uri="{FF2B5EF4-FFF2-40B4-BE49-F238E27FC236}">
+                <a16:creationId xmlns:a16="http://schemas.microsoft.com/office/drawing/2014/main" id="{3A2C5854-C21F-B19A-9DAE-6D9D8C470926}"/>
+              </a:ext>
+            </a:extLst>
+          </p:cNvPr>
+          <p:cNvSpPr>
+            <a:spLocks noGrp="1"/>
+          </p:cNvSpPr>
+          <p:nvPr>
+            <p:ph type="sldNum" sz="quarter" idx="5"/>
+          </p:nvPr>
+        </p:nvSpPr>
+        <p:spPr/>
+        <p:txBody>
+          <a:bodyPr/>
+          <a:lstStyle/>
+          <a:p>
+            <a:fld id="{4F9FBC38-293A-4128-8897-DC4F2AE6DC9E}" type="slidenum">
+              <a:rPr lang="en-US" smtClean="0"/>
+              <a:t>17</a:t>
+            </a:fld>
+            <a:endParaRPr lang="en-US"/>
+          </a:p>
+        </p:txBody>
+      </p:sp>
+    </p:spTree>
+    <p:extLst>
+      <p:ext uri="{BB962C8B-B14F-4D97-AF65-F5344CB8AC3E}">
+        <p14:creationId xmlns:p14="http://schemas.microsoft.com/office/powerpoint/2010/main" val="89796235"/>
+      </p:ext>
+    </p:extLst>
+  </p:cSld>
+  <p:clrMapOvr>
+    <a:masterClrMapping/>
+  </p:clrMapOvr>
+</p:notes>
+</file>
+
+<file path=ppt/notesSlides/notesSlide16.xml><?xml version="1.0" encoding="utf-8"?>
+<p:notes xmlns:a="http://schemas.openxmlformats.org/drawingml/2006/main" xmlns:r="http://schemas.openxmlformats.org/officeDocument/2006/relationships" xmlns:p="http://schemas.openxmlformats.org/presentationml/2006/main">
+  <p:cSld>
+    <p:spTree>
+      <p:nvGrpSpPr>
+        <p:cNvPr id="1" name="">
+          <a:extLst>
+            <a:ext uri="{FF2B5EF4-FFF2-40B4-BE49-F238E27FC236}">
+              <a16:creationId xmlns:a16="http://schemas.microsoft.com/office/drawing/2014/main" id="{7658F536-9650-CF64-8464-91591E41C89B}"/>
+            </a:ext>
+          </a:extLst>
+        </p:cNvPr>
+        <p:cNvGrpSpPr/>
+        <p:nvPr/>
+      </p:nvGrpSpPr>
+      <p:grpSpPr>
+        <a:xfrm>
+          <a:off x="0" y="0"/>
+          <a:ext cx="0" cy="0"/>
+          <a:chOff x="0" y="0"/>
+          <a:chExt cx="0" cy="0"/>
+        </a:xfrm>
+      </p:grpSpPr>
+      <p:sp>
+        <p:nvSpPr>
+          <p:cNvPr id="2" name="Slide Image Placeholder 1">
+            <a:extLst>
+              <a:ext uri="{FF2B5EF4-FFF2-40B4-BE49-F238E27FC236}">
+                <a16:creationId xmlns:a16="http://schemas.microsoft.com/office/drawing/2014/main" id="{3FFBD5E4-4D43-99AB-BE75-61615EADD528}"/>
+              </a:ext>
+            </a:extLst>
+          </p:cNvPr>
+          <p:cNvSpPr>
+            <a:spLocks noGrp="1" noRot="1" noChangeAspect="1"/>
+          </p:cNvSpPr>
+          <p:nvPr>
+            <p:ph type="sldImg"/>
+          </p:nvPr>
+        </p:nvSpPr>
+        <p:spPr/>
+      </p:sp>
+      <p:sp>
+        <p:nvSpPr>
+          <p:cNvPr id="3" name="Notes Placeholder 2">
+            <a:extLst>
+              <a:ext uri="{FF2B5EF4-FFF2-40B4-BE49-F238E27FC236}">
+                <a16:creationId xmlns:a16="http://schemas.microsoft.com/office/drawing/2014/main" id="{E93E8F5D-3AA3-73F4-1C35-2B128629E007}"/>
+              </a:ext>
+            </a:extLst>
+          </p:cNvPr>
+          <p:cNvSpPr>
+            <a:spLocks noGrp="1"/>
+          </p:cNvSpPr>
+          <p:nvPr>
+            <p:ph type="body" idx="1"/>
+          </p:nvPr>
+        </p:nvSpPr>
+        <p:spPr/>
+        <p:txBody>
+          <a:bodyPr/>
+          <a:lstStyle/>
+          <a:p>
+            <a:endParaRPr lang="en-US" dirty="0"/>
+          </a:p>
+        </p:txBody>
+      </p:sp>
+      <p:sp>
+        <p:nvSpPr>
+          <p:cNvPr id="4" name="Slide Number Placeholder 3">
+            <a:extLst>
+              <a:ext uri="{FF2B5EF4-FFF2-40B4-BE49-F238E27FC236}">
+                <a16:creationId xmlns:a16="http://schemas.microsoft.com/office/drawing/2014/main" id="{124E8664-DD16-330E-F355-164BE123DF57}"/>
+              </a:ext>
+            </a:extLst>
+          </p:cNvPr>
+          <p:cNvSpPr>
+            <a:spLocks noGrp="1"/>
+          </p:cNvSpPr>
+          <p:nvPr>
+            <p:ph type="sldNum" sz="quarter" idx="5"/>
+          </p:nvPr>
+        </p:nvSpPr>
+        <p:spPr/>
+        <p:txBody>
+          <a:bodyPr/>
+          <a:lstStyle/>
+          <a:p>
+            <a:fld id="{4F9FBC38-293A-4128-8897-DC4F2AE6DC9E}" type="slidenum">
+              <a:rPr lang="en-US" smtClean="0"/>
+              <a:t>18</a:t>
+            </a:fld>
+            <a:endParaRPr lang="en-US"/>
+          </a:p>
+        </p:txBody>
+      </p:sp>
+    </p:spTree>
+    <p:extLst>
+      <p:ext uri="{BB962C8B-B14F-4D97-AF65-F5344CB8AC3E}">
+        <p14:creationId xmlns:p14="http://schemas.microsoft.com/office/powerpoint/2010/main" val="1902816677"/>
+      </p:ext>
+    </p:extLst>
+  </p:cSld>
+  <p:clrMapOvr>
+    <a:masterClrMapping/>
+  </p:clrMapOvr>
+</p:notes>
+</file>
+
+<file path=ppt/notesSlides/notesSlide17.xml><?xml version="1.0" encoding="utf-8"?>
+<p:notes xmlns:a="http://schemas.openxmlformats.org/drawingml/2006/main" xmlns:r="http://schemas.openxmlformats.org/officeDocument/2006/relationships" xmlns:p="http://schemas.openxmlformats.org/presentationml/2006/main">
+  <p:cSld>
+    <p:spTree>
+      <p:nvGrpSpPr>
+        <p:cNvPr id="1" name="">
+          <a:extLst>
+            <a:ext uri="{FF2B5EF4-FFF2-40B4-BE49-F238E27FC236}">
+              <a16:creationId xmlns:a16="http://schemas.microsoft.com/office/drawing/2014/main" id="{F35E1D79-C164-5D8B-B32F-E73A4B9A9AD9}"/>
+            </a:ext>
+          </a:extLst>
+        </p:cNvPr>
+        <p:cNvGrpSpPr/>
+        <p:nvPr/>
+      </p:nvGrpSpPr>
+      <p:grpSpPr>
+        <a:xfrm>
+          <a:off x="0" y="0"/>
+          <a:ext cx="0" cy="0"/>
+          <a:chOff x="0" y="0"/>
+          <a:chExt cx="0" cy="0"/>
+        </a:xfrm>
+      </p:grpSpPr>
+      <p:sp>
+        <p:nvSpPr>
+          <p:cNvPr id="2" name="Slide Image Placeholder 1">
+            <a:extLst>
+              <a:ext uri="{FF2B5EF4-FFF2-40B4-BE49-F238E27FC236}">
+                <a16:creationId xmlns:a16="http://schemas.microsoft.com/office/drawing/2014/main" id="{2ABE6037-0DD8-5E7A-3638-090224FD273A}"/>
+              </a:ext>
+            </a:extLst>
+          </p:cNvPr>
+          <p:cNvSpPr>
+            <a:spLocks noGrp="1" noRot="1" noChangeAspect="1"/>
+          </p:cNvSpPr>
+          <p:nvPr>
+            <p:ph type="sldImg"/>
+          </p:nvPr>
+        </p:nvSpPr>
+        <p:spPr/>
+      </p:sp>
+      <p:sp>
+        <p:nvSpPr>
+          <p:cNvPr id="3" name="Notes Placeholder 2">
+            <a:extLst>
+              <a:ext uri="{FF2B5EF4-FFF2-40B4-BE49-F238E27FC236}">
+                <a16:creationId xmlns:a16="http://schemas.microsoft.com/office/drawing/2014/main" id="{53E0B767-545F-1606-6752-643BF6EE6BCA}"/>
+              </a:ext>
+            </a:extLst>
+          </p:cNvPr>
+          <p:cNvSpPr>
+            <a:spLocks noGrp="1"/>
+          </p:cNvSpPr>
+          <p:nvPr>
+            <p:ph type="body" idx="1"/>
+          </p:nvPr>
+        </p:nvSpPr>
+        <p:spPr/>
+        <p:txBody>
+          <a:bodyPr/>
+          <a:lstStyle/>
+          <a:p>
+            <a:endParaRPr lang="en-US" dirty="0"/>
+          </a:p>
+        </p:txBody>
+      </p:sp>
+      <p:sp>
+        <p:nvSpPr>
+          <p:cNvPr id="4" name="Slide Number Placeholder 3">
+            <a:extLst>
+              <a:ext uri="{FF2B5EF4-FFF2-40B4-BE49-F238E27FC236}">
+                <a16:creationId xmlns:a16="http://schemas.microsoft.com/office/drawing/2014/main" id="{0A7C27E1-19B7-922C-B2A1-044A7D04EA5A}"/>
+              </a:ext>
+            </a:extLst>
+          </p:cNvPr>
+          <p:cNvSpPr>
+            <a:spLocks noGrp="1"/>
+          </p:cNvSpPr>
+          <p:nvPr>
+            <p:ph type="sldNum" sz="quarter" idx="5"/>
+          </p:nvPr>
+        </p:nvSpPr>
+        <p:spPr/>
+        <p:txBody>
+          <a:bodyPr/>
+          <a:lstStyle/>
+          <a:p>
+            <a:fld id="{4F9FBC38-293A-4128-8897-DC4F2AE6DC9E}" type="slidenum">
+              <a:rPr lang="en-US" smtClean="0"/>
+              <a:t>19</a:t>
+            </a:fld>
+            <a:endParaRPr lang="en-US"/>
+          </a:p>
+        </p:txBody>
+      </p:sp>
+    </p:spTree>
+    <p:extLst>
+      <p:ext uri="{BB962C8B-B14F-4D97-AF65-F5344CB8AC3E}">
+        <p14:creationId xmlns:p14="http://schemas.microsoft.com/office/powerpoint/2010/main" val="288260083"/>
+      </p:ext>
+    </p:extLst>
+  </p:cSld>
+  <p:clrMapOvr>
+    <a:masterClrMapping/>
+  </p:clrMapOvr>
+</p:notes>
+</file>
+
+<file path=ppt/notesSlides/notesSlide18.xml><?xml version="1.0" encoding="utf-8"?>
+<p:notes xmlns:a="http://schemas.openxmlformats.org/drawingml/2006/main" xmlns:r="http://schemas.openxmlformats.org/officeDocument/2006/relationships" xmlns:p="http://schemas.openxmlformats.org/presentationml/2006/main">
+  <p:cSld>
+    <p:spTree>
+      <p:nvGrpSpPr>
+        <p:cNvPr id="1" name="">
+          <a:extLst>
+            <a:ext uri="{FF2B5EF4-FFF2-40B4-BE49-F238E27FC236}">
+              <a16:creationId xmlns:a16="http://schemas.microsoft.com/office/drawing/2014/main" id="{4DF6C6E2-4ED2-081B-B8B6-D532BE722164}"/>
+            </a:ext>
+          </a:extLst>
+        </p:cNvPr>
+        <p:cNvGrpSpPr/>
+        <p:nvPr/>
+      </p:nvGrpSpPr>
+      <p:grpSpPr>
+        <a:xfrm>
+          <a:off x="0" y="0"/>
+          <a:ext cx="0" cy="0"/>
+          <a:chOff x="0" y="0"/>
+          <a:chExt cx="0" cy="0"/>
+        </a:xfrm>
+      </p:grpSpPr>
+      <p:sp>
+        <p:nvSpPr>
+          <p:cNvPr id="2" name="Slide Image Placeholder 1">
+            <a:extLst>
+              <a:ext uri="{FF2B5EF4-FFF2-40B4-BE49-F238E27FC236}">
+                <a16:creationId xmlns:a16="http://schemas.microsoft.com/office/drawing/2014/main" id="{C58694F8-F1C6-0207-C0FB-68D829357724}"/>
+              </a:ext>
+            </a:extLst>
+          </p:cNvPr>
+          <p:cNvSpPr>
+            <a:spLocks noGrp="1" noRot="1" noChangeAspect="1"/>
+          </p:cNvSpPr>
+          <p:nvPr>
+            <p:ph type="sldImg"/>
+          </p:nvPr>
+        </p:nvSpPr>
+        <p:spPr/>
+      </p:sp>
+      <p:sp>
+        <p:nvSpPr>
+          <p:cNvPr id="3" name="Notes Placeholder 2">
+            <a:extLst>
+              <a:ext uri="{FF2B5EF4-FFF2-40B4-BE49-F238E27FC236}">
+                <a16:creationId xmlns:a16="http://schemas.microsoft.com/office/drawing/2014/main" id="{1CC0D16D-6350-70C7-3CC3-D9ACA0081CC1}"/>
+              </a:ext>
+            </a:extLst>
+          </p:cNvPr>
+          <p:cNvSpPr>
+            <a:spLocks noGrp="1"/>
+          </p:cNvSpPr>
+          <p:nvPr>
+            <p:ph type="body" idx="1"/>
+          </p:nvPr>
+        </p:nvSpPr>
+        <p:spPr/>
+        <p:txBody>
+          <a:bodyPr/>
+          <a:lstStyle/>
+          <a:p>
+            <a:endParaRPr lang="en-US" dirty="0"/>
+          </a:p>
+        </p:txBody>
+      </p:sp>
+      <p:sp>
+        <p:nvSpPr>
+          <p:cNvPr id="4" name="Slide Number Placeholder 3">
+            <a:extLst>
+              <a:ext uri="{FF2B5EF4-FFF2-40B4-BE49-F238E27FC236}">
+                <a16:creationId xmlns:a16="http://schemas.microsoft.com/office/drawing/2014/main" id="{6BA0C25E-5290-E12F-06BD-3EB947A3DCA1}"/>
+              </a:ext>
+            </a:extLst>
+          </p:cNvPr>
+          <p:cNvSpPr>
+            <a:spLocks noGrp="1"/>
+          </p:cNvSpPr>
+          <p:nvPr>
+            <p:ph type="sldNum" sz="quarter" idx="5"/>
+          </p:nvPr>
+        </p:nvSpPr>
+        <p:spPr/>
+        <p:txBody>
+          <a:bodyPr/>
+          <a:lstStyle/>
+          <a:p>
+            <a:fld id="{4F9FBC38-293A-4128-8897-DC4F2AE6DC9E}" type="slidenum">
+              <a:rPr lang="en-US" smtClean="0"/>
+              <a:t>20</a:t>
+            </a:fld>
+            <a:endParaRPr lang="en-US"/>
+          </a:p>
+        </p:txBody>
+      </p:sp>
+    </p:spTree>
+    <p:extLst>
+      <p:ext uri="{BB962C8B-B14F-4D97-AF65-F5344CB8AC3E}">
+        <p14:creationId xmlns:p14="http://schemas.microsoft.com/office/powerpoint/2010/main" val="2572480045"/>
+      </p:ext>
+    </p:extLst>
+  </p:cSld>
+  <p:clrMapOvr>
+    <a:masterClrMapping/>
+  </p:clrMapOvr>
+</p:notes>
+</file>
+
+<file path=ppt/notesSlides/notesSlide19.xml><?xml version="1.0" encoding="utf-8"?>
+<p:notes xmlns:a="http://schemas.openxmlformats.org/drawingml/2006/main" xmlns:r="http://schemas.openxmlformats.org/officeDocument/2006/relationships" xmlns:p="http://schemas.openxmlformats.org/presentationml/2006/main">
+  <p:cSld>
+    <p:spTree>
+      <p:nvGrpSpPr>
+        <p:cNvPr id="1" name="">
+          <a:extLst>
+            <a:ext uri="{FF2B5EF4-FFF2-40B4-BE49-F238E27FC236}">
+              <a16:creationId xmlns:a16="http://schemas.microsoft.com/office/drawing/2014/main" id="{40891FCE-8FE4-A174-525E-7FBBA33C9A71}"/>
+            </a:ext>
+          </a:extLst>
+        </p:cNvPr>
+        <p:cNvGrpSpPr/>
+        <p:nvPr/>
+      </p:nvGrpSpPr>
+      <p:grpSpPr>
+        <a:xfrm>
+          <a:off x="0" y="0"/>
+          <a:ext cx="0" cy="0"/>
+          <a:chOff x="0" y="0"/>
+          <a:chExt cx="0" cy="0"/>
+        </a:xfrm>
+      </p:grpSpPr>
+      <p:sp>
+        <p:nvSpPr>
+          <p:cNvPr id="2" name="Slide Image Placeholder 1">
+            <a:extLst>
+              <a:ext uri="{FF2B5EF4-FFF2-40B4-BE49-F238E27FC236}">
+                <a16:creationId xmlns:a16="http://schemas.microsoft.com/office/drawing/2014/main" id="{7C5B7ACD-94F2-BCB1-787B-F21F07CFB4B0}"/>
+              </a:ext>
+            </a:extLst>
+          </p:cNvPr>
+          <p:cNvSpPr>
+            <a:spLocks noGrp="1" noRot="1" noChangeAspect="1"/>
+          </p:cNvSpPr>
+          <p:nvPr>
+            <p:ph type="sldImg"/>
+          </p:nvPr>
+        </p:nvSpPr>
+        <p:spPr/>
+      </p:sp>
+      <p:sp>
+        <p:nvSpPr>
+          <p:cNvPr id="3" name="Notes Placeholder 2">
+            <a:extLst>
+              <a:ext uri="{FF2B5EF4-FFF2-40B4-BE49-F238E27FC236}">
+                <a16:creationId xmlns:a16="http://schemas.microsoft.com/office/drawing/2014/main" id="{0A80A554-8158-D019-6D6E-0D0EC5D26485}"/>
+              </a:ext>
+            </a:extLst>
+          </p:cNvPr>
+          <p:cNvSpPr>
+            <a:spLocks noGrp="1"/>
+          </p:cNvSpPr>
+          <p:nvPr>
+            <p:ph type="body" idx="1"/>
+          </p:nvPr>
+        </p:nvSpPr>
+        <p:spPr/>
+        <p:txBody>
+          <a:bodyPr/>
+          <a:lstStyle/>
+          <a:p>
+            <a:endParaRPr lang="en-US" dirty="0"/>
+          </a:p>
+        </p:txBody>
+      </p:sp>
+      <p:sp>
+        <p:nvSpPr>
+          <p:cNvPr id="4" name="Slide Number Placeholder 3">
+            <a:extLst>
+              <a:ext uri="{FF2B5EF4-FFF2-40B4-BE49-F238E27FC236}">
+                <a16:creationId xmlns:a16="http://schemas.microsoft.com/office/drawing/2014/main" id="{EAACF355-9166-1DB5-3BCB-C1CCA22998CA}"/>
+              </a:ext>
+            </a:extLst>
+          </p:cNvPr>
+          <p:cNvSpPr>
+            <a:spLocks noGrp="1"/>
+          </p:cNvSpPr>
+          <p:nvPr>
+            <p:ph type="sldNum" sz="quarter" idx="5"/>
+          </p:nvPr>
+        </p:nvSpPr>
+        <p:spPr/>
+        <p:txBody>
+          <a:bodyPr/>
+          <a:lstStyle/>
+          <a:p>
+            <a:fld id="{4F9FBC38-293A-4128-8897-DC4F2AE6DC9E}" type="slidenum">
+              <a:rPr lang="en-US" smtClean="0"/>
+              <a:t>21</a:t>
+            </a:fld>
+            <a:endParaRPr lang="en-US"/>
+          </a:p>
+        </p:txBody>
+      </p:sp>
+    </p:spTree>
+    <p:extLst>
+      <p:ext uri="{BB962C8B-B14F-4D97-AF65-F5344CB8AC3E}">
+        <p14:creationId xmlns:p14="http://schemas.microsoft.com/office/powerpoint/2010/main" val="2078016185"/>
       </p:ext>
     </p:extLst>
   </p:cSld>
@@ -5931,10 +6803,10 @@
       </p:pic>
       <p:pic>
         <p:nvPicPr>
-          <p:cNvPr id="8" name="Picture 7">
-            <a:extLst>
-              <a:ext uri="{FF2B5EF4-FFF2-40B4-BE49-F238E27FC236}">
-                <a16:creationId xmlns:a16="http://schemas.microsoft.com/office/drawing/2014/main" id="{174A0F44-0E3D-46EA-D710-85364EBD7C36}"/>
+          <p:cNvPr id="7" name="Picture 6">
+            <a:extLst>
+              <a:ext uri="{FF2B5EF4-FFF2-40B4-BE49-F238E27FC236}">
+                <a16:creationId xmlns:a16="http://schemas.microsoft.com/office/drawing/2014/main" id="{827BF666-5264-07D7-ECC4-8C27FA8D48FD}"/>
               </a:ext>
             </a:extLst>
           </p:cNvPr>
@@ -5951,144 +6823,8 @@
         </p:blipFill>
         <p:spPr>
           <a:xfrm>
-            <a:off x="45278" y="5855044"/>
-            <a:ext cx="1390844" cy="885949"/>
-          </a:xfrm>
-          <a:prstGeom prst="rect">
-            <a:avLst/>
-          </a:prstGeom>
-        </p:spPr>
-      </p:pic>
-      <p:sp>
-        <p:nvSpPr>
-          <p:cNvPr id="15" name="TextBox 14">
-            <a:extLst>
-              <a:ext uri="{FF2B5EF4-FFF2-40B4-BE49-F238E27FC236}">
-                <a16:creationId xmlns:a16="http://schemas.microsoft.com/office/drawing/2014/main" id="{9069BB49-60E8-18EB-5901-ACE63FA12F92}"/>
-              </a:ext>
-            </a:extLst>
-          </p:cNvPr>
-          <p:cNvSpPr txBox="1"/>
-          <p:nvPr/>
-        </p:nvSpPr>
-        <p:spPr>
-          <a:xfrm>
-            <a:off x="1107980" y="6000371"/>
-            <a:ext cx="1630343" cy="646331"/>
-          </a:xfrm>
-          <a:prstGeom prst="rect">
-            <a:avLst/>
-          </a:prstGeom>
-          <a:noFill/>
-        </p:spPr>
-        <p:txBody>
-          <a:bodyPr wrap="square" rtlCol="0">
-            <a:spAutoFit/>
-          </a:bodyPr>
-          <a:lstStyle/>
-          <a:p>
-            <a:pPr algn="ctr"/>
-            <a:r>
-              <a:rPr lang="en-US" dirty="0"/>
-              <a:t>Servo Horn Screw</a:t>
-            </a:r>
-          </a:p>
-        </p:txBody>
-      </p:sp>
-      <p:sp>
-        <p:nvSpPr>
-          <p:cNvPr id="20" name="TextBox 19">
-            <a:extLst>
-              <a:ext uri="{FF2B5EF4-FFF2-40B4-BE49-F238E27FC236}">
-                <a16:creationId xmlns:a16="http://schemas.microsoft.com/office/drawing/2014/main" id="{18052976-23FB-E72F-C1CC-2DBC68295054}"/>
-              </a:ext>
-            </a:extLst>
-          </p:cNvPr>
-          <p:cNvSpPr txBox="1"/>
-          <p:nvPr/>
-        </p:nvSpPr>
-        <p:spPr>
-          <a:xfrm>
-            <a:off x="1344239" y="5232991"/>
-            <a:ext cx="1630343" cy="646331"/>
-          </a:xfrm>
-          <a:prstGeom prst="rect">
-            <a:avLst/>
-          </a:prstGeom>
-          <a:noFill/>
-        </p:spPr>
-        <p:txBody>
-          <a:bodyPr wrap="square" rtlCol="0">
-            <a:spAutoFit/>
-          </a:bodyPr>
-          <a:lstStyle/>
-          <a:p>
-            <a:r>
-              <a:rPr lang="en-US" dirty="0"/>
-              <a:t>Arm Upper Servo Horn</a:t>
-            </a:r>
-          </a:p>
-        </p:txBody>
-      </p:sp>
-      <p:sp>
-        <p:nvSpPr>
-          <p:cNvPr id="21" name="TextBox 20">
-            <a:extLst>
-              <a:ext uri="{FF2B5EF4-FFF2-40B4-BE49-F238E27FC236}">
-                <a16:creationId xmlns:a16="http://schemas.microsoft.com/office/drawing/2014/main" id="{98A44E01-51E0-041B-4744-F5B2BC44A281}"/>
-              </a:ext>
-            </a:extLst>
-          </p:cNvPr>
-          <p:cNvSpPr txBox="1"/>
-          <p:nvPr/>
-        </p:nvSpPr>
-        <p:spPr>
-          <a:xfrm>
-            <a:off x="1403512" y="4206013"/>
-            <a:ext cx="1920576" cy="369332"/>
-          </a:xfrm>
-          <a:prstGeom prst="rect">
-            <a:avLst/>
-          </a:prstGeom>
-          <a:noFill/>
-        </p:spPr>
-        <p:txBody>
-          <a:bodyPr wrap="square" rtlCol="0">
-            <a:spAutoFit/>
-          </a:bodyPr>
-          <a:lstStyle/>
-          <a:p>
-            <a:r>
-              <a:rPr lang="en-US" dirty="0"/>
-              <a:t>Servo</a:t>
-            </a:r>
-          </a:p>
-        </p:txBody>
-      </p:sp>
-      <p:pic>
-        <p:nvPicPr>
-          <p:cNvPr id="3" name="Picture 2">
-            <a:extLst>
-              <a:ext uri="{FF2B5EF4-FFF2-40B4-BE49-F238E27FC236}">
-                <a16:creationId xmlns:a16="http://schemas.microsoft.com/office/drawing/2014/main" id="{2E733A0E-BE54-6562-13DE-09BD6A046F30}"/>
-              </a:ext>
-            </a:extLst>
-          </p:cNvPr>
-          <p:cNvPicPr>
-            <a:picLocks noChangeAspect="1"/>
-          </p:cNvPicPr>
-          <p:nvPr/>
-        </p:nvPicPr>
-        <p:blipFill>
-          <a:blip r:embed="rId5"/>
-          <a:stretch>
-            <a:fillRect/>
-          </a:stretch>
-        </p:blipFill>
-        <p:spPr>
-          <a:xfrm>
-            <a:off x="3909853" y="135328"/>
-            <a:ext cx="7346876" cy="6707547"/>
+            <a:off x="3628559" y="15125"/>
+            <a:ext cx="8340099" cy="6858000"/>
           </a:xfrm>
           <a:prstGeom prst="rect">
             <a:avLst/>
@@ -6153,66 +6889,6 @@
           </a:p>
         </p:txBody>
       </p:sp>
-      <p:pic>
-        <p:nvPicPr>
-          <p:cNvPr id="6" name="Picture 5">
-            <a:extLst>
-              <a:ext uri="{FF2B5EF4-FFF2-40B4-BE49-F238E27FC236}">
-                <a16:creationId xmlns:a16="http://schemas.microsoft.com/office/drawing/2014/main" id="{3A1705C8-D79D-8EC7-7972-124BDB00E075}"/>
-              </a:ext>
-            </a:extLst>
-          </p:cNvPr>
-          <p:cNvPicPr>
-            <a:picLocks noChangeAspect="1"/>
-          </p:cNvPicPr>
-          <p:nvPr/>
-        </p:nvPicPr>
-        <p:blipFill>
-          <a:blip r:embed="rId6"/>
-          <a:stretch>
-            <a:fillRect/>
-          </a:stretch>
-        </p:blipFill>
-        <p:spPr>
-          <a:xfrm>
-            <a:off x="223342" y="4923667"/>
-            <a:ext cx="884638" cy="982184"/>
-          </a:xfrm>
-          <a:prstGeom prst="rect">
-            <a:avLst/>
-          </a:prstGeom>
-        </p:spPr>
-      </p:pic>
-      <p:pic>
-        <p:nvPicPr>
-          <p:cNvPr id="11" name="Picture 10">
-            <a:extLst>
-              <a:ext uri="{FF2B5EF4-FFF2-40B4-BE49-F238E27FC236}">
-                <a16:creationId xmlns:a16="http://schemas.microsoft.com/office/drawing/2014/main" id="{6250E512-98A1-E009-5112-202D232BB758}"/>
-              </a:ext>
-            </a:extLst>
-          </p:cNvPr>
-          <p:cNvPicPr>
-            <a:picLocks noChangeAspect="1"/>
-          </p:cNvPicPr>
-          <p:nvPr/>
-        </p:nvPicPr>
-        <p:blipFill>
-          <a:blip r:embed="rId7"/>
-          <a:stretch>
-            <a:fillRect/>
-          </a:stretch>
-        </p:blipFill>
-        <p:spPr>
-          <a:xfrm>
-            <a:off x="21551" y="3863147"/>
-            <a:ext cx="1420368" cy="1018196"/>
-          </a:xfrm>
-          <a:prstGeom prst="rect">
-            <a:avLst/>
-          </a:prstGeom>
-        </p:spPr>
-      </p:pic>
       <p:sp>
         <p:nvSpPr>
           <p:cNvPr id="2" name="TextBox 1">
@@ -6244,7 +6920,7 @@
             <a:pPr algn="ctr"/>
             <a:r>
               <a:rPr lang="en-US" dirty="0"/>
-              <a:t>Connect servo to RPI first, the PORT and STARBOARD servos should go in pine 1 and 2 (the first pin is 0).</a:t>
+              <a:t>Press in the 608 bearing (metal or printed) in the Arm Left / Right Mount</a:t>
             </a:r>
             <a:endParaRPr lang="en-US" b="0" i="0" dirty="0">
               <a:solidFill>
@@ -6270,6 +6946,399 @@
 </file>
 
 <file path=ppt/slides/slide12.xml><?xml version="1.0" encoding="utf-8"?>
+<p:sld xmlns:a="http://schemas.openxmlformats.org/drawingml/2006/main" xmlns:r="http://schemas.openxmlformats.org/officeDocument/2006/relationships" xmlns:p="http://schemas.openxmlformats.org/presentationml/2006/main">
+  <p:cSld>
+    <p:spTree>
+      <p:nvGrpSpPr>
+        <p:cNvPr id="1" name="">
+          <a:extLst>
+            <a:ext uri="{FF2B5EF4-FFF2-40B4-BE49-F238E27FC236}">
+              <a16:creationId xmlns:a16="http://schemas.microsoft.com/office/drawing/2014/main" id="{F3AD3A0F-DEF1-1039-0AFD-7E52ECFA9E84}"/>
+            </a:ext>
+          </a:extLst>
+        </p:cNvPr>
+        <p:cNvGrpSpPr/>
+        <p:nvPr/>
+      </p:nvGrpSpPr>
+      <p:grpSpPr>
+        <a:xfrm>
+          <a:off x="0" y="0"/>
+          <a:ext cx="0" cy="0"/>
+          <a:chOff x="0" y="0"/>
+          <a:chExt cx="0" cy="0"/>
+        </a:xfrm>
+      </p:grpSpPr>
+      <p:pic>
+        <p:nvPicPr>
+          <p:cNvPr id="13" name="Picture 12">
+            <a:extLst>
+              <a:ext uri="{FF2B5EF4-FFF2-40B4-BE49-F238E27FC236}">
+                <a16:creationId xmlns:a16="http://schemas.microsoft.com/office/drawing/2014/main" id="{A4F33693-699C-5410-0B92-819CC76EED03}"/>
+              </a:ext>
+            </a:extLst>
+          </p:cNvPr>
+          <p:cNvPicPr>
+            <a:picLocks noChangeAspect="1"/>
+          </p:cNvPicPr>
+          <p:nvPr/>
+        </p:nvPicPr>
+        <p:blipFill>
+          <a:blip r:embed="rId3"/>
+          <a:stretch>
+            <a:fillRect/>
+          </a:stretch>
+        </p:blipFill>
+        <p:spPr>
+          <a:xfrm>
+            <a:off x="21551" y="15125"/>
+            <a:ext cx="12192000" cy="6858000"/>
+          </a:xfrm>
+          <a:prstGeom prst="rect">
+            <a:avLst/>
+          </a:prstGeom>
+        </p:spPr>
+      </p:pic>
+      <p:pic>
+        <p:nvPicPr>
+          <p:cNvPr id="8" name="Picture 7">
+            <a:extLst>
+              <a:ext uri="{FF2B5EF4-FFF2-40B4-BE49-F238E27FC236}">
+                <a16:creationId xmlns:a16="http://schemas.microsoft.com/office/drawing/2014/main" id="{18F63162-FCF9-3353-2878-13BAAFB1469B}"/>
+              </a:ext>
+            </a:extLst>
+          </p:cNvPr>
+          <p:cNvPicPr>
+            <a:picLocks noChangeAspect="1"/>
+          </p:cNvPicPr>
+          <p:nvPr/>
+        </p:nvPicPr>
+        <p:blipFill>
+          <a:blip r:embed="rId4"/>
+          <a:stretch>
+            <a:fillRect/>
+          </a:stretch>
+        </p:blipFill>
+        <p:spPr>
+          <a:xfrm>
+            <a:off x="45278" y="5855044"/>
+            <a:ext cx="1390844" cy="885949"/>
+          </a:xfrm>
+          <a:prstGeom prst="rect">
+            <a:avLst/>
+          </a:prstGeom>
+        </p:spPr>
+      </p:pic>
+      <p:sp>
+        <p:nvSpPr>
+          <p:cNvPr id="15" name="TextBox 14">
+            <a:extLst>
+              <a:ext uri="{FF2B5EF4-FFF2-40B4-BE49-F238E27FC236}">
+                <a16:creationId xmlns:a16="http://schemas.microsoft.com/office/drawing/2014/main" id="{18CECFC5-D0D6-8463-064A-4F3A53004C9D}"/>
+              </a:ext>
+            </a:extLst>
+          </p:cNvPr>
+          <p:cNvSpPr txBox="1"/>
+          <p:nvPr/>
+        </p:nvSpPr>
+        <p:spPr>
+          <a:xfrm>
+            <a:off x="1107980" y="6000371"/>
+            <a:ext cx="1630343" cy="646331"/>
+          </a:xfrm>
+          <a:prstGeom prst="rect">
+            <a:avLst/>
+          </a:prstGeom>
+          <a:noFill/>
+        </p:spPr>
+        <p:txBody>
+          <a:bodyPr wrap="square" rtlCol="0">
+            <a:spAutoFit/>
+          </a:bodyPr>
+          <a:lstStyle/>
+          <a:p>
+            <a:pPr algn="ctr"/>
+            <a:r>
+              <a:rPr lang="en-US" dirty="0"/>
+              <a:t>Servo Horn Screw</a:t>
+            </a:r>
+          </a:p>
+        </p:txBody>
+      </p:sp>
+      <p:sp>
+        <p:nvSpPr>
+          <p:cNvPr id="20" name="TextBox 19">
+            <a:extLst>
+              <a:ext uri="{FF2B5EF4-FFF2-40B4-BE49-F238E27FC236}">
+                <a16:creationId xmlns:a16="http://schemas.microsoft.com/office/drawing/2014/main" id="{61E8794E-FD93-A70A-950F-27DAE1F7F6B0}"/>
+              </a:ext>
+            </a:extLst>
+          </p:cNvPr>
+          <p:cNvSpPr txBox="1"/>
+          <p:nvPr/>
+        </p:nvSpPr>
+        <p:spPr>
+          <a:xfrm>
+            <a:off x="1344239" y="5232991"/>
+            <a:ext cx="1630343" cy="646331"/>
+          </a:xfrm>
+          <a:prstGeom prst="rect">
+            <a:avLst/>
+          </a:prstGeom>
+          <a:noFill/>
+        </p:spPr>
+        <p:txBody>
+          <a:bodyPr wrap="square" rtlCol="0">
+            <a:spAutoFit/>
+          </a:bodyPr>
+          <a:lstStyle/>
+          <a:p>
+            <a:r>
+              <a:rPr lang="en-US" dirty="0"/>
+              <a:t>Arm Upper Servo Horn</a:t>
+            </a:r>
+          </a:p>
+        </p:txBody>
+      </p:sp>
+      <p:sp>
+        <p:nvSpPr>
+          <p:cNvPr id="21" name="TextBox 20">
+            <a:extLst>
+              <a:ext uri="{FF2B5EF4-FFF2-40B4-BE49-F238E27FC236}">
+                <a16:creationId xmlns:a16="http://schemas.microsoft.com/office/drawing/2014/main" id="{C8BAE2B0-44E3-3EFD-59D3-B953591A8380}"/>
+              </a:ext>
+            </a:extLst>
+          </p:cNvPr>
+          <p:cNvSpPr txBox="1"/>
+          <p:nvPr/>
+        </p:nvSpPr>
+        <p:spPr>
+          <a:xfrm>
+            <a:off x="1403512" y="4206013"/>
+            <a:ext cx="1920576" cy="369332"/>
+          </a:xfrm>
+          <a:prstGeom prst="rect">
+            <a:avLst/>
+          </a:prstGeom>
+          <a:noFill/>
+        </p:spPr>
+        <p:txBody>
+          <a:bodyPr wrap="square" rtlCol="0">
+            <a:spAutoFit/>
+          </a:bodyPr>
+          <a:lstStyle/>
+          <a:p>
+            <a:r>
+              <a:rPr lang="en-US" dirty="0"/>
+              <a:t>Servo</a:t>
+            </a:r>
+          </a:p>
+        </p:txBody>
+      </p:sp>
+      <p:pic>
+        <p:nvPicPr>
+          <p:cNvPr id="3" name="Picture 2">
+            <a:extLst>
+              <a:ext uri="{FF2B5EF4-FFF2-40B4-BE49-F238E27FC236}">
+                <a16:creationId xmlns:a16="http://schemas.microsoft.com/office/drawing/2014/main" id="{F744BE84-C6DB-5972-E76A-13F115DEEF8C}"/>
+              </a:ext>
+            </a:extLst>
+          </p:cNvPr>
+          <p:cNvPicPr>
+            <a:picLocks noChangeAspect="1"/>
+          </p:cNvPicPr>
+          <p:nvPr/>
+        </p:nvPicPr>
+        <p:blipFill>
+          <a:blip r:embed="rId5"/>
+          <a:stretch>
+            <a:fillRect/>
+          </a:stretch>
+        </p:blipFill>
+        <p:spPr>
+          <a:xfrm>
+            <a:off x="3909853" y="135328"/>
+            <a:ext cx="7346876" cy="6707547"/>
+          </a:xfrm>
+          <a:prstGeom prst="rect">
+            <a:avLst/>
+          </a:prstGeom>
+        </p:spPr>
+      </p:pic>
+      <p:sp>
+        <p:nvSpPr>
+          <p:cNvPr id="4" name="Rectangle 3">
+            <a:extLst>
+              <a:ext uri="{FF2B5EF4-FFF2-40B4-BE49-F238E27FC236}">
+                <a16:creationId xmlns:a16="http://schemas.microsoft.com/office/drawing/2014/main" id="{060E164B-4D26-FC10-E029-14E294E02466}"/>
+              </a:ext>
+            </a:extLst>
+          </p:cNvPr>
+          <p:cNvSpPr/>
+          <p:nvPr/>
+        </p:nvSpPr>
+        <p:spPr>
+          <a:xfrm>
+            <a:off x="53759" y="-124391"/>
+            <a:ext cx="835485" cy="923330"/>
+          </a:xfrm>
+          <a:prstGeom prst="rect">
+            <a:avLst/>
+          </a:prstGeom>
+          <a:noFill/>
+        </p:spPr>
+        <p:txBody>
+          <a:bodyPr wrap="none" lIns="91440" tIns="45720" rIns="91440" bIns="45720">
+            <a:spAutoFit/>
+          </a:bodyPr>
+          <a:lstStyle/>
+          <a:p>
+            <a:pPr algn="ctr"/>
+            <a:r>
+              <a:rPr lang="en-US" sz="5400" dirty="0">
+                <a:ln w="0"/>
+                <a:effectLst>
+                  <a:outerShdw blurRad="38100" dist="19050" dir="2700000" algn="tl" rotWithShape="0">
+                    <a:schemeClr val="dk1">
+                      <a:alpha val="40000"/>
+                    </a:schemeClr>
+                  </a:outerShdw>
+                </a:effectLst>
+              </a:rPr>
+              <a:t>x2</a:t>
+            </a:r>
+            <a:endParaRPr lang="en-US" sz="5400" b="0" cap="none" spc="0" dirty="0">
+              <a:ln w="0"/>
+              <a:solidFill>
+                <a:schemeClr val="tx1"/>
+              </a:solidFill>
+              <a:effectLst>
+                <a:outerShdw blurRad="38100" dist="19050" dir="2700000" algn="tl" rotWithShape="0">
+                  <a:schemeClr val="dk1">
+                    <a:alpha val="40000"/>
+                  </a:schemeClr>
+                </a:outerShdw>
+              </a:effectLst>
+            </a:endParaRPr>
+          </a:p>
+        </p:txBody>
+      </p:sp>
+      <p:pic>
+        <p:nvPicPr>
+          <p:cNvPr id="6" name="Picture 5">
+            <a:extLst>
+              <a:ext uri="{FF2B5EF4-FFF2-40B4-BE49-F238E27FC236}">
+                <a16:creationId xmlns:a16="http://schemas.microsoft.com/office/drawing/2014/main" id="{E8EE0700-6D90-A30F-F20E-47FE8197F769}"/>
+              </a:ext>
+            </a:extLst>
+          </p:cNvPr>
+          <p:cNvPicPr>
+            <a:picLocks noChangeAspect="1"/>
+          </p:cNvPicPr>
+          <p:nvPr/>
+        </p:nvPicPr>
+        <p:blipFill>
+          <a:blip r:embed="rId6"/>
+          <a:stretch>
+            <a:fillRect/>
+          </a:stretch>
+        </p:blipFill>
+        <p:spPr>
+          <a:xfrm>
+            <a:off x="223342" y="4923667"/>
+            <a:ext cx="884638" cy="982184"/>
+          </a:xfrm>
+          <a:prstGeom prst="rect">
+            <a:avLst/>
+          </a:prstGeom>
+        </p:spPr>
+      </p:pic>
+      <p:pic>
+        <p:nvPicPr>
+          <p:cNvPr id="11" name="Picture 10">
+            <a:extLst>
+              <a:ext uri="{FF2B5EF4-FFF2-40B4-BE49-F238E27FC236}">
+                <a16:creationId xmlns:a16="http://schemas.microsoft.com/office/drawing/2014/main" id="{C38522B8-B1A1-9D98-99BC-3B32A9945386}"/>
+              </a:ext>
+            </a:extLst>
+          </p:cNvPr>
+          <p:cNvPicPr>
+            <a:picLocks noChangeAspect="1"/>
+          </p:cNvPicPr>
+          <p:nvPr/>
+        </p:nvPicPr>
+        <p:blipFill>
+          <a:blip r:embed="rId7"/>
+          <a:stretch>
+            <a:fillRect/>
+          </a:stretch>
+        </p:blipFill>
+        <p:spPr>
+          <a:xfrm>
+            <a:off x="21551" y="3863147"/>
+            <a:ext cx="1420368" cy="1018196"/>
+          </a:xfrm>
+          <a:prstGeom prst="rect">
+            <a:avLst/>
+          </a:prstGeom>
+        </p:spPr>
+      </p:pic>
+      <p:sp>
+        <p:nvSpPr>
+          <p:cNvPr id="2" name="TextBox 1">
+            <a:extLst>
+              <a:ext uri="{FF2B5EF4-FFF2-40B4-BE49-F238E27FC236}">
+                <a16:creationId xmlns:a16="http://schemas.microsoft.com/office/drawing/2014/main" id="{ECB28E13-06AA-DCE0-66FB-0340A2AFFF0B}"/>
+              </a:ext>
+            </a:extLst>
+          </p:cNvPr>
+          <p:cNvSpPr txBox="1"/>
+          <p:nvPr/>
+        </p:nvSpPr>
+        <p:spPr>
+          <a:xfrm>
+            <a:off x="471501" y="1141805"/>
+            <a:ext cx="3655963" cy="923330"/>
+          </a:xfrm>
+          <a:prstGeom prst="rect">
+            <a:avLst/>
+          </a:prstGeom>
+          <a:noFill/>
+        </p:spPr>
+        <p:txBody>
+          <a:bodyPr wrap="square" rtlCol="0">
+            <a:spAutoFit/>
+          </a:bodyPr>
+          <a:lstStyle/>
+          <a:p>
+            <a:pPr algn="ctr"/>
+            <a:r>
+              <a:rPr lang="en-US" dirty="0"/>
+              <a:t>Connect servo to RPI first, the PORT and STARBOARD servos should go in pine 1 and 2 (the first pin is 0).</a:t>
+            </a:r>
+            <a:endParaRPr lang="en-US" b="0" i="0" dirty="0">
+              <a:solidFill>
+                <a:srgbClr val="0F1111"/>
+              </a:solidFill>
+              <a:effectLst/>
+              <a:latin typeface="Amazon Ember"/>
+            </a:endParaRPr>
+          </a:p>
+        </p:txBody>
+      </p:sp>
+    </p:spTree>
+    <p:extLst>
+      <p:ext uri="{BB962C8B-B14F-4D97-AF65-F5344CB8AC3E}">
+        <p14:creationId xmlns:p14="http://schemas.microsoft.com/office/powerpoint/2010/main" val="993452311"/>
+      </p:ext>
+    </p:extLst>
+  </p:cSld>
+  <p:clrMapOvr>
+    <a:masterClrMapping/>
+  </p:clrMapOvr>
+</p:sld>
+</file>
+
+<file path=ppt/slides/slide13.xml><?xml version="1.0" encoding="utf-8"?>
 <p:sld xmlns:a="http://schemas.openxmlformats.org/drawingml/2006/main" xmlns:r="http://schemas.openxmlformats.org/officeDocument/2006/relationships" xmlns:p="http://schemas.openxmlformats.org/presentationml/2006/main">
   <p:cSld>
     <p:spTree>
@@ -6654,7 +7723,7 @@
 </p:sld>
 </file>
 
-<file path=ppt/slides/slide13.xml><?xml version="1.0" encoding="utf-8"?>
+<file path=ppt/slides/slide14.xml><?xml version="1.0" encoding="utf-8"?>
 <p:sld xmlns:a="http://schemas.openxmlformats.org/drawingml/2006/main" xmlns:r="http://schemas.openxmlformats.org/officeDocument/2006/relationships" xmlns:p="http://schemas.openxmlformats.org/presentationml/2006/main">
   <p:cSld>
     <p:spTree>
@@ -7030,6 +8099,987 @@
     <p:extLst>
       <p:ext uri="{BB962C8B-B14F-4D97-AF65-F5344CB8AC3E}">
         <p14:creationId xmlns:p14="http://schemas.microsoft.com/office/powerpoint/2010/main" val="2271496560"/>
+      </p:ext>
+    </p:extLst>
+  </p:cSld>
+  <p:clrMapOvr>
+    <a:masterClrMapping/>
+  </p:clrMapOvr>
+</p:sld>
+</file>
+
+<file path=ppt/slides/slide15.xml><?xml version="1.0" encoding="utf-8"?>
+<p:sld xmlns:a="http://schemas.openxmlformats.org/drawingml/2006/main" xmlns:r="http://schemas.openxmlformats.org/officeDocument/2006/relationships" xmlns:p="http://schemas.openxmlformats.org/presentationml/2006/main">
+  <p:cSld>
+    <p:spTree>
+      <p:nvGrpSpPr>
+        <p:cNvPr id="1" name="">
+          <a:extLst>
+            <a:ext uri="{FF2B5EF4-FFF2-40B4-BE49-F238E27FC236}">
+              <a16:creationId xmlns:a16="http://schemas.microsoft.com/office/drawing/2014/main" id="{E0961129-83C0-2FC0-9DD0-4842DEB20D81}"/>
+            </a:ext>
+          </a:extLst>
+        </p:cNvPr>
+        <p:cNvGrpSpPr/>
+        <p:nvPr/>
+      </p:nvGrpSpPr>
+      <p:grpSpPr>
+        <a:xfrm>
+          <a:off x="0" y="0"/>
+          <a:ext cx="0" cy="0"/>
+          <a:chOff x="0" y="0"/>
+          <a:chExt cx="0" cy="0"/>
+        </a:xfrm>
+      </p:grpSpPr>
+      <p:pic>
+        <p:nvPicPr>
+          <p:cNvPr id="13" name="Picture 12">
+            <a:extLst>
+              <a:ext uri="{FF2B5EF4-FFF2-40B4-BE49-F238E27FC236}">
+                <a16:creationId xmlns:a16="http://schemas.microsoft.com/office/drawing/2014/main" id="{63C06E52-C158-9089-F517-C7BFBAC05D21}"/>
+              </a:ext>
+            </a:extLst>
+          </p:cNvPr>
+          <p:cNvPicPr>
+            <a:picLocks noChangeAspect="1"/>
+          </p:cNvPicPr>
+          <p:nvPr/>
+        </p:nvPicPr>
+        <p:blipFill>
+          <a:blip r:embed="rId3"/>
+          <a:stretch>
+            <a:fillRect/>
+          </a:stretch>
+        </p:blipFill>
+        <p:spPr>
+          <a:xfrm>
+            <a:off x="21551" y="15125"/>
+            <a:ext cx="12192000" cy="6858000"/>
+          </a:xfrm>
+          <a:prstGeom prst="rect">
+            <a:avLst/>
+          </a:prstGeom>
+        </p:spPr>
+      </p:pic>
+      <p:pic>
+        <p:nvPicPr>
+          <p:cNvPr id="3" name="Picture 2">
+            <a:extLst>
+              <a:ext uri="{FF2B5EF4-FFF2-40B4-BE49-F238E27FC236}">
+                <a16:creationId xmlns:a16="http://schemas.microsoft.com/office/drawing/2014/main" id="{2AE7D5C8-188F-4BF2-F295-24FF4FE2B2FA}"/>
+              </a:ext>
+            </a:extLst>
+          </p:cNvPr>
+          <p:cNvPicPr>
+            <a:picLocks noChangeAspect="1"/>
+          </p:cNvPicPr>
+          <p:nvPr/>
+        </p:nvPicPr>
+        <p:blipFill>
+          <a:blip r:embed="rId4"/>
+          <a:stretch>
+            <a:fillRect/>
+          </a:stretch>
+        </p:blipFill>
+        <p:spPr>
+          <a:xfrm>
+            <a:off x="4887067" y="1445589"/>
+            <a:ext cx="5430008" cy="3572374"/>
+          </a:xfrm>
+          <a:prstGeom prst="rect">
+            <a:avLst/>
+          </a:prstGeom>
+        </p:spPr>
+      </p:pic>
+      <p:sp>
+        <p:nvSpPr>
+          <p:cNvPr id="6" name="TextBox 5">
+            <a:extLst>
+              <a:ext uri="{FF2B5EF4-FFF2-40B4-BE49-F238E27FC236}">
+                <a16:creationId xmlns:a16="http://schemas.microsoft.com/office/drawing/2014/main" id="{EF0F1DAB-F509-4FBA-C9B8-15A3A2508FCD}"/>
+              </a:ext>
+            </a:extLst>
+          </p:cNvPr>
+          <p:cNvSpPr txBox="1"/>
+          <p:nvPr/>
+        </p:nvSpPr>
+        <p:spPr>
+          <a:xfrm>
+            <a:off x="471501" y="1141805"/>
+            <a:ext cx="3655963" cy="646331"/>
+          </a:xfrm>
+          <a:prstGeom prst="rect">
+            <a:avLst/>
+          </a:prstGeom>
+          <a:noFill/>
+        </p:spPr>
+        <p:txBody>
+          <a:bodyPr wrap="square" rtlCol="0">
+            <a:spAutoFit/>
+          </a:bodyPr>
+          <a:lstStyle/>
+          <a:p>
+            <a:pPr algn="ctr"/>
+            <a:r>
+              <a:rPr lang="en-US" dirty="0"/>
+              <a:t>Insert secondary Axle main lifting rod into center servo.</a:t>
+            </a:r>
+            <a:endParaRPr lang="en-US" b="0" i="0" dirty="0">
+              <a:solidFill>
+                <a:srgbClr val="0F1111"/>
+              </a:solidFill>
+              <a:effectLst/>
+              <a:latin typeface="Amazon Ember"/>
+            </a:endParaRPr>
+          </a:p>
+        </p:txBody>
+      </p:sp>
+    </p:spTree>
+    <p:extLst>
+      <p:ext uri="{BB962C8B-B14F-4D97-AF65-F5344CB8AC3E}">
+        <p14:creationId xmlns:p14="http://schemas.microsoft.com/office/powerpoint/2010/main" val="657512318"/>
+      </p:ext>
+    </p:extLst>
+  </p:cSld>
+  <p:clrMapOvr>
+    <a:masterClrMapping/>
+  </p:clrMapOvr>
+</p:sld>
+</file>
+
+<file path=ppt/slides/slide16.xml><?xml version="1.0" encoding="utf-8"?>
+<p:sld xmlns:a="http://schemas.openxmlformats.org/drawingml/2006/main" xmlns:r="http://schemas.openxmlformats.org/officeDocument/2006/relationships" xmlns:p="http://schemas.openxmlformats.org/presentationml/2006/main">
+  <p:cSld>
+    <p:spTree>
+      <p:nvGrpSpPr>
+        <p:cNvPr id="1" name="">
+          <a:extLst>
+            <a:ext uri="{FF2B5EF4-FFF2-40B4-BE49-F238E27FC236}">
+              <a16:creationId xmlns:a16="http://schemas.microsoft.com/office/drawing/2014/main" id="{DEC77A47-64A4-AB26-0BF7-88DDF58EFACA}"/>
+            </a:ext>
+          </a:extLst>
+        </p:cNvPr>
+        <p:cNvGrpSpPr/>
+        <p:nvPr/>
+      </p:nvGrpSpPr>
+      <p:grpSpPr>
+        <a:xfrm>
+          <a:off x="0" y="0"/>
+          <a:ext cx="0" cy="0"/>
+          <a:chOff x="0" y="0"/>
+          <a:chExt cx="0" cy="0"/>
+        </a:xfrm>
+      </p:grpSpPr>
+      <p:pic>
+        <p:nvPicPr>
+          <p:cNvPr id="13" name="Picture 12">
+            <a:extLst>
+              <a:ext uri="{FF2B5EF4-FFF2-40B4-BE49-F238E27FC236}">
+                <a16:creationId xmlns:a16="http://schemas.microsoft.com/office/drawing/2014/main" id="{19612EE8-7B66-0386-EB2A-5CFA208870BA}"/>
+              </a:ext>
+            </a:extLst>
+          </p:cNvPr>
+          <p:cNvPicPr>
+            <a:picLocks noChangeAspect="1"/>
+          </p:cNvPicPr>
+          <p:nvPr/>
+        </p:nvPicPr>
+        <p:blipFill>
+          <a:blip r:embed="rId3"/>
+          <a:stretch>
+            <a:fillRect/>
+          </a:stretch>
+        </p:blipFill>
+        <p:spPr>
+          <a:xfrm>
+            <a:off x="21551" y="15125"/>
+            <a:ext cx="12192000" cy="6858000"/>
+          </a:xfrm>
+          <a:prstGeom prst="rect">
+            <a:avLst/>
+          </a:prstGeom>
+        </p:spPr>
+      </p:pic>
+      <p:pic>
+        <p:nvPicPr>
+          <p:cNvPr id="3" name="Picture 2">
+            <a:extLst>
+              <a:ext uri="{FF2B5EF4-FFF2-40B4-BE49-F238E27FC236}">
+                <a16:creationId xmlns:a16="http://schemas.microsoft.com/office/drawing/2014/main" id="{1D0BBBC3-AD83-E395-1766-1F45D2CB7402}"/>
+              </a:ext>
+            </a:extLst>
+          </p:cNvPr>
+          <p:cNvPicPr>
+            <a:picLocks noChangeAspect="1"/>
+          </p:cNvPicPr>
+          <p:nvPr/>
+        </p:nvPicPr>
+        <p:blipFill>
+          <a:blip r:embed="rId4"/>
+          <a:stretch>
+            <a:fillRect/>
+          </a:stretch>
+        </p:blipFill>
+        <p:spPr>
+          <a:xfrm>
+            <a:off x="1995508" y="15125"/>
+            <a:ext cx="10174941" cy="6858000"/>
+          </a:xfrm>
+          <a:prstGeom prst="rect">
+            <a:avLst/>
+          </a:prstGeom>
+        </p:spPr>
+      </p:pic>
+      <p:sp>
+        <p:nvSpPr>
+          <p:cNvPr id="6" name="TextBox 5">
+            <a:extLst>
+              <a:ext uri="{FF2B5EF4-FFF2-40B4-BE49-F238E27FC236}">
+                <a16:creationId xmlns:a16="http://schemas.microsoft.com/office/drawing/2014/main" id="{4D8D0FAC-498C-0467-BEBE-802484700E47}"/>
+              </a:ext>
+            </a:extLst>
+          </p:cNvPr>
+          <p:cNvSpPr txBox="1"/>
+          <p:nvPr/>
+        </p:nvSpPr>
+        <p:spPr>
+          <a:xfrm>
+            <a:off x="21551" y="774252"/>
+            <a:ext cx="3655963" cy="2031325"/>
+          </a:xfrm>
+          <a:prstGeom prst="rect">
+            <a:avLst/>
+          </a:prstGeom>
+          <a:noFill/>
+        </p:spPr>
+        <p:txBody>
+          <a:bodyPr wrap="square" rtlCol="0">
+            <a:spAutoFit/>
+          </a:bodyPr>
+          <a:lstStyle/>
+          <a:p>
+            <a:pPr algn="ctr"/>
+            <a:r>
+              <a:rPr lang="en-US" dirty="0"/>
+              <a:t>Slide the Left arm mount in </a:t>
+            </a:r>
+          </a:p>
+          <a:p>
+            <a:pPr algn="ctr"/>
+            <a:endParaRPr lang="en-US" dirty="0"/>
+          </a:p>
+          <a:p>
+            <a:pPr algn="ctr"/>
+            <a:r>
+              <a:rPr lang="en-US" b="0" i="0" dirty="0">
+                <a:solidFill>
+                  <a:srgbClr val="0F1111"/>
+                </a:solidFill>
+                <a:effectLst/>
+                <a:latin typeface="Amazon Ember"/>
+              </a:rPr>
+              <a:t>Slid</a:t>
+            </a:r>
+            <a:r>
+              <a:rPr lang="en-US" dirty="0">
+                <a:solidFill>
+                  <a:srgbClr val="0F1111"/>
+                </a:solidFill>
+                <a:latin typeface="Amazon Ember"/>
+              </a:rPr>
+              <a:t>e in upper rod and screw into place.</a:t>
+            </a:r>
+          </a:p>
+          <a:p>
+            <a:pPr algn="ctr"/>
+            <a:endParaRPr lang="en-US" b="0" i="0" dirty="0">
+              <a:solidFill>
+                <a:srgbClr val="0F1111"/>
+              </a:solidFill>
+              <a:effectLst/>
+              <a:latin typeface="Amazon Ember"/>
+            </a:endParaRPr>
+          </a:p>
+          <a:p>
+            <a:pPr algn="ctr"/>
+            <a:r>
+              <a:rPr lang="en-US" dirty="0">
+                <a:solidFill>
+                  <a:srgbClr val="0F1111"/>
+                </a:solidFill>
+                <a:latin typeface="Amazon Ember"/>
+              </a:rPr>
+              <a:t>Repeat process on </a:t>
+            </a:r>
+          </a:p>
+          <a:p>
+            <a:pPr algn="ctr"/>
+            <a:r>
+              <a:rPr lang="en-US" dirty="0">
+                <a:solidFill>
+                  <a:srgbClr val="0F1111"/>
+                </a:solidFill>
+                <a:latin typeface="Amazon Ember"/>
+              </a:rPr>
+              <a:t>right side</a:t>
+            </a:r>
+            <a:endParaRPr lang="en-US" b="0" i="0" dirty="0">
+              <a:solidFill>
+                <a:srgbClr val="0F1111"/>
+              </a:solidFill>
+              <a:effectLst/>
+              <a:latin typeface="Amazon Ember"/>
+            </a:endParaRPr>
+          </a:p>
+        </p:txBody>
+      </p:sp>
+      <p:cxnSp>
+        <p:nvCxnSpPr>
+          <p:cNvPr id="8" name="Straight Arrow Connector 7">
+            <a:extLst>
+              <a:ext uri="{FF2B5EF4-FFF2-40B4-BE49-F238E27FC236}">
+                <a16:creationId xmlns:a16="http://schemas.microsoft.com/office/drawing/2014/main" id="{176E3147-E36D-806F-BDB6-9F374AF59912}"/>
+              </a:ext>
+            </a:extLst>
+          </p:cNvPr>
+          <p:cNvCxnSpPr/>
+          <p:nvPr/>
+        </p:nvCxnSpPr>
+        <p:spPr>
+          <a:xfrm>
+            <a:off x="4867835" y="1488142"/>
+            <a:ext cx="0" cy="394447"/>
+          </a:xfrm>
+          <a:prstGeom prst="straightConnector1">
+            <a:avLst/>
+          </a:prstGeom>
+          <a:ln>
+            <a:tailEnd type="triangle"/>
+          </a:ln>
+        </p:spPr>
+        <p:style>
+          <a:lnRef idx="1">
+            <a:schemeClr val="dk1"/>
+          </a:lnRef>
+          <a:fillRef idx="0">
+            <a:schemeClr val="dk1"/>
+          </a:fillRef>
+          <a:effectRef idx="0">
+            <a:schemeClr val="dk1"/>
+          </a:effectRef>
+          <a:fontRef idx="minor">
+            <a:schemeClr val="tx1"/>
+          </a:fontRef>
+        </p:style>
+      </p:cxnSp>
+      <p:cxnSp>
+        <p:nvCxnSpPr>
+          <p:cNvPr id="10" name="Straight Arrow Connector 9">
+            <a:extLst>
+              <a:ext uri="{FF2B5EF4-FFF2-40B4-BE49-F238E27FC236}">
+                <a16:creationId xmlns:a16="http://schemas.microsoft.com/office/drawing/2014/main" id="{C3A54043-0FBD-A3E8-CA64-33A867804212}"/>
+              </a:ext>
+            </a:extLst>
+          </p:cNvPr>
+          <p:cNvCxnSpPr/>
+          <p:nvPr/>
+        </p:nvCxnSpPr>
+        <p:spPr>
+          <a:xfrm>
+            <a:off x="5163670" y="1479177"/>
+            <a:ext cx="0" cy="394447"/>
+          </a:xfrm>
+          <a:prstGeom prst="straightConnector1">
+            <a:avLst/>
+          </a:prstGeom>
+          <a:ln>
+            <a:tailEnd type="triangle"/>
+          </a:ln>
+        </p:spPr>
+        <p:style>
+          <a:lnRef idx="1">
+            <a:schemeClr val="dk1"/>
+          </a:lnRef>
+          <a:fillRef idx="0">
+            <a:schemeClr val="dk1"/>
+          </a:fillRef>
+          <a:effectRef idx="0">
+            <a:schemeClr val="dk1"/>
+          </a:effectRef>
+          <a:fontRef idx="minor">
+            <a:schemeClr val="tx1"/>
+          </a:fontRef>
+        </p:style>
+      </p:cxnSp>
+    </p:spTree>
+    <p:extLst>
+      <p:ext uri="{BB962C8B-B14F-4D97-AF65-F5344CB8AC3E}">
+        <p14:creationId xmlns:p14="http://schemas.microsoft.com/office/powerpoint/2010/main" val="3645881239"/>
+      </p:ext>
+    </p:extLst>
+  </p:cSld>
+  <p:clrMapOvr>
+    <a:masterClrMapping/>
+  </p:clrMapOvr>
+</p:sld>
+</file>
+
+<file path=ppt/slides/slide17.xml><?xml version="1.0" encoding="utf-8"?>
+<p:sld xmlns:a="http://schemas.openxmlformats.org/drawingml/2006/main" xmlns:r="http://schemas.openxmlformats.org/officeDocument/2006/relationships" xmlns:p="http://schemas.openxmlformats.org/presentationml/2006/main">
+  <p:cSld>
+    <p:spTree>
+      <p:nvGrpSpPr>
+        <p:cNvPr id="1" name="">
+          <a:extLst>
+            <a:ext uri="{FF2B5EF4-FFF2-40B4-BE49-F238E27FC236}">
+              <a16:creationId xmlns:a16="http://schemas.microsoft.com/office/drawing/2014/main" id="{65EA4B15-1CA8-039B-4A88-E51A1B7F75E8}"/>
+            </a:ext>
+          </a:extLst>
+        </p:cNvPr>
+        <p:cNvGrpSpPr/>
+        <p:nvPr/>
+      </p:nvGrpSpPr>
+      <p:grpSpPr>
+        <a:xfrm>
+          <a:off x="0" y="0"/>
+          <a:ext cx="0" cy="0"/>
+          <a:chOff x="0" y="0"/>
+          <a:chExt cx="0" cy="0"/>
+        </a:xfrm>
+      </p:grpSpPr>
+      <p:pic>
+        <p:nvPicPr>
+          <p:cNvPr id="13" name="Picture 12">
+            <a:extLst>
+              <a:ext uri="{FF2B5EF4-FFF2-40B4-BE49-F238E27FC236}">
+                <a16:creationId xmlns:a16="http://schemas.microsoft.com/office/drawing/2014/main" id="{2BE26BCC-C0A6-CFA2-D948-B6FA60707BBE}"/>
+              </a:ext>
+            </a:extLst>
+          </p:cNvPr>
+          <p:cNvPicPr>
+            <a:picLocks noChangeAspect="1"/>
+          </p:cNvPicPr>
+          <p:nvPr/>
+        </p:nvPicPr>
+        <p:blipFill>
+          <a:blip r:embed="rId3"/>
+          <a:stretch>
+            <a:fillRect/>
+          </a:stretch>
+        </p:blipFill>
+        <p:spPr>
+          <a:xfrm>
+            <a:off x="21551" y="15125"/>
+            <a:ext cx="12192000" cy="6858000"/>
+          </a:xfrm>
+          <a:prstGeom prst="rect">
+            <a:avLst/>
+          </a:prstGeom>
+        </p:spPr>
+      </p:pic>
+      <p:cxnSp>
+        <p:nvCxnSpPr>
+          <p:cNvPr id="8" name="Straight Arrow Connector 7">
+            <a:extLst>
+              <a:ext uri="{FF2B5EF4-FFF2-40B4-BE49-F238E27FC236}">
+                <a16:creationId xmlns:a16="http://schemas.microsoft.com/office/drawing/2014/main" id="{9FCC086E-C47F-9AD7-A405-351A84B759CF}"/>
+              </a:ext>
+            </a:extLst>
+          </p:cNvPr>
+          <p:cNvCxnSpPr/>
+          <p:nvPr/>
+        </p:nvCxnSpPr>
+        <p:spPr>
+          <a:xfrm>
+            <a:off x="4867835" y="1488142"/>
+            <a:ext cx="0" cy="394447"/>
+          </a:xfrm>
+          <a:prstGeom prst="straightConnector1">
+            <a:avLst/>
+          </a:prstGeom>
+          <a:ln>
+            <a:tailEnd type="triangle"/>
+          </a:ln>
+        </p:spPr>
+        <p:style>
+          <a:lnRef idx="1">
+            <a:schemeClr val="dk1"/>
+          </a:lnRef>
+          <a:fillRef idx="0">
+            <a:schemeClr val="dk1"/>
+          </a:fillRef>
+          <a:effectRef idx="0">
+            <a:schemeClr val="dk1"/>
+          </a:effectRef>
+          <a:fontRef idx="minor">
+            <a:schemeClr val="tx1"/>
+          </a:fontRef>
+        </p:style>
+      </p:cxnSp>
+      <p:cxnSp>
+        <p:nvCxnSpPr>
+          <p:cNvPr id="10" name="Straight Arrow Connector 9">
+            <a:extLst>
+              <a:ext uri="{FF2B5EF4-FFF2-40B4-BE49-F238E27FC236}">
+                <a16:creationId xmlns:a16="http://schemas.microsoft.com/office/drawing/2014/main" id="{AA1C3029-1645-6795-FC5A-DB2E0AA6DBB9}"/>
+              </a:ext>
+            </a:extLst>
+          </p:cNvPr>
+          <p:cNvCxnSpPr/>
+          <p:nvPr/>
+        </p:nvCxnSpPr>
+        <p:spPr>
+          <a:xfrm>
+            <a:off x="5163670" y="1479177"/>
+            <a:ext cx="0" cy="394447"/>
+          </a:xfrm>
+          <a:prstGeom prst="straightConnector1">
+            <a:avLst/>
+          </a:prstGeom>
+          <a:ln>
+            <a:tailEnd type="triangle"/>
+          </a:ln>
+        </p:spPr>
+        <p:style>
+          <a:lnRef idx="1">
+            <a:schemeClr val="dk1"/>
+          </a:lnRef>
+          <a:fillRef idx="0">
+            <a:schemeClr val="dk1"/>
+          </a:fillRef>
+          <a:effectRef idx="0">
+            <a:schemeClr val="dk1"/>
+          </a:effectRef>
+          <a:fontRef idx="minor">
+            <a:schemeClr val="tx1"/>
+          </a:fontRef>
+        </p:style>
+      </p:cxnSp>
+      <p:pic>
+        <p:nvPicPr>
+          <p:cNvPr id="4" name="Picture 3">
+            <a:extLst>
+              <a:ext uri="{FF2B5EF4-FFF2-40B4-BE49-F238E27FC236}">
+                <a16:creationId xmlns:a16="http://schemas.microsoft.com/office/drawing/2014/main" id="{A879584B-4F67-7415-DF5D-7811223814D9}"/>
+              </a:ext>
+            </a:extLst>
+          </p:cNvPr>
+          <p:cNvPicPr>
+            <a:picLocks noChangeAspect="1"/>
+          </p:cNvPicPr>
+          <p:nvPr/>
+        </p:nvPicPr>
+        <p:blipFill>
+          <a:blip r:embed="rId4"/>
+          <a:stretch>
+            <a:fillRect/>
+          </a:stretch>
+        </p:blipFill>
+        <p:spPr>
+          <a:xfrm>
+            <a:off x="2860035" y="15125"/>
+            <a:ext cx="9310414" cy="6858000"/>
+          </a:xfrm>
+          <a:prstGeom prst="rect">
+            <a:avLst/>
+          </a:prstGeom>
+        </p:spPr>
+      </p:pic>
+      <p:sp>
+        <p:nvSpPr>
+          <p:cNvPr id="6" name="TextBox 5">
+            <a:extLst>
+              <a:ext uri="{FF2B5EF4-FFF2-40B4-BE49-F238E27FC236}">
+                <a16:creationId xmlns:a16="http://schemas.microsoft.com/office/drawing/2014/main" id="{60966C45-99EC-BE27-018A-910C535FCDAD}"/>
+              </a:ext>
+            </a:extLst>
+          </p:cNvPr>
+          <p:cNvSpPr txBox="1"/>
+          <p:nvPr/>
+        </p:nvSpPr>
+        <p:spPr>
+          <a:xfrm>
+            <a:off x="21551" y="774252"/>
+            <a:ext cx="3655963" cy="646331"/>
+          </a:xfrm>
+          <a:prstGeom prst="rect">
+            <a:avLst/>
+          </a:prstGeom>
+          <a:noFill/>
+        </p:spPr>
+        <p:txBody>
+          <a:bodyPr wrap="square" rtlCol="0">
+            <a:spAutoFit/>
+          </a:bodyPr>
+          <a:lstStyle/>
+          <a:p>
+            <a:pPr algn="ctr"/>
+            <a:r>
+              <a:rPr lang="en-US" dirty="0"/>
+              <a:t>Rotate main arms and slide in center servo rod assembly.</a:t>
+            </a:r>
+          </a:p>
+        </p:txBody>
+      </p:sp>
+    </p:spTree>
+    <p:extLst>
+      <p:ext uri="{BB962C8B-B14F-4D97-AF65-F5344CB8AC3E}">
+        <p14:creationId xmlns:p14="http://schemas.microsoft.com/office/powerpoint/2010/main" val="94351655"/>
+      </p:ext>
+    </p:extLst>
+  </p:cSld>
+  <p:clrMapOvr>
+    <a:masterClrMapping/>
+  </p:clrMapOvr>
+</p:sld>
+</file>
+
+<file path=ppt/slides/slide18.xml><?xml version="1.0" encoding="utf-8"?>
+<p:sld xmlns:a="http://schemas.openxmlformats.org/drawingml/2006/main" xmlns:r="http://schemas.openxmlformats.org/officeDocument/2006/relationships" xmlns:p="http://schemas.openxmlformats.org/presentationml/2006/main">
+  <p:cSld>
+    <p:spTree>
+      <p:nvGrpSpPr>
+        <p:cNvPr id="1" name="">
+          <a:extLst>
+            <a:ext uri="{FF2B5EF4-FFF2-40B4-BE49-F238E27FC236}">
+              <a16:creationId xmlns:a16="http://schemas.microsoft.com/office/drawing/2014/main" id="{C9829520-10E3-298B-1413-89388ACEF997}"/>
+            </a:ext>
+          </a:extLst>
+        </p:cNvPr>
+        <p:cNvGrpSpPr/>
+        <p:nvPr/>
+      </p:nvGrpSpPr>
+      <p:grpSpPr>
+        <a:xfrm>
+          <a:off x="0" y="0"/>
+          <a:ext cx="0" cy="0"/>
+          <a:chOff x="0" y="0"/>
+          <a:chExt cx="0" cy="0"/>
+        </a:xfrm>
+      </p:grpSpPr>
+      <p:pic>
+        <p:nvPicPr>
+          <p:cNvPr id="13" name="Picture 12">
+            <a:extLst>
+              <a:ext uri="{FF2B5EF4-FFF2-40B4-BE49-F238E27FC236}">
+                <a16:creationId xmlns:a16="http://schemas.microsoft.com/office/drawing/2014/main" id="{0B713A9C-7404-25D1-114A-1F1CDE862585}"/>
+              </a:ext>
+            </a:extLst>
+          </p:cNvPr>
+          <p:cNvPicPr>
+            <a:picLocks noChangeAspect="1"/>
+          </p:cNvPicPr>
+          <p:nvPr/>
+        </p:nvPicPr>
+        <p:blipFill>
+          <a:blip r:embed="rId3"/>
+          <a:stretch>
+            <a:fillRect/>
+          </a:stretch>
+        </p:blipFill>
+        <p:spPr>
+          <a:xfrm>
+            <a:off x="21551" y="15125"/>
+            <a:ext cx="12192000" cy="6858000"/>
+          </a:xfrm>
+          <a:prstGeom prst="rect">
+            <a:avLst/>
+          </a:prstGeom>
+        </p:spPr>
+      </p:pic>
+      <p:pic>
+        <p:nvPicPr>
+          <p:cNvPr id="3" name="Picture 2">
+            <a:extLst>
+              <a:ext uri="{FF2B5EF4-FFF2-40B4-BE49-F238E27FC236}">
+                <a16:creationId xmlns:a16="http://schemas.microsoft.com/office/drawing/2014/main" id="{E54DED4D-B0A9-7A13-35C5-175970AC9C9A}"/>
+              </a:ext>
+            </a:extLst>
+          </p:cNvPr>
+          <p:cNvPicPr>
+            <a:picLocks noChangeAspect="1"/>
+          </p:cNvPicPr>
+          <p:nvPr/>
+        </p:nvPicPr>
+        <p:blipFill>
+          <a:blip r:embed="rId4"/>
+          <a:stretch>
+            <a:fillRect/>
+          </a:stretch>
+        </p:blipFill>
+        <p:spPr>
+          <a:xfrm>
+            <a:off x="1779904" y="395221"/>
+            <a:ext cx="10174120" cy="6477904"/>
+          </a:xfrm>
+          <a:prstGeom prst="rect">
+            <a:avLst/>
+          </a:prstGeom>
+        </p:spPr>
+      </p:pic>
+      <p:cxnSp>
+        <p:nvCxnSpPr>
+          <p:cNvPr id="8" name="Straight Arrow Connector 7">
+            <a:extLst>
+              <a:ext uri="{FF2B5EF4-FFF2-40B4-BE49-F238E27FC236}">
+                <a16:creationId xmlns:a16="http://schemas.microsoft.com/office/drawing/2014/main" id="{48EA7408-CFA5-7A68-40DE-7C49725B6A3E}"/>
+              </a:ext>
+            </a:extLst>
+          </p:cNvPr>
+          <p:cNvCxnSpPr/>
+          <p:nvPr/>
+        </p:nvCxnSpPr>
+        <p:spPr>
+          <a:xfrm>
+            <a:off x="5056093" y="865679"/>
+            <a:ext cx="0" cy="394447"/>
+          </a:xfrm>
+          <a:prstGeom prst="straightConnector1">
+            <a:avLst/>
+          </a:prstGeom>
+          <a:ln>
+            <a:tailEnd type="triangle"/>
+          </a:ln>
+        </p:spPr>
+        <p:style>
+          <a:lnRef idx="1">
+            <a:schemeClr val="dk1"/>
+          </a:lnRef>
+          <a:fillRef idx="0">
+            <a:schemeClr val="dk1"/>
+          </a:fillRef>
+          <a:effectRef idx="0">
+            <a:schemeClr val="dk1"/>
+          </a:effectRef>
+          <a:fontRef idx="minor">
+            <a:schemeClr val="tx1"/>
+          </a:fontRef>
+        </p:style>
+      </p:cxnSp>
+      <p:cxnSp>
+        <p:nvCxnSpPr>
+          <p:cNvPr id="10" name="Straight Arrow Connector 9">
+            <a:extLst>
+              <a:ext uri="{FF2B5EF4-FFF2-40B4-BE49-F238E27FC236}">
+                <a16:creationId xmlns:a16="http://schemas.microsoft.com/office/drawing/2014/main" id="{BE367062-4360-42BD-25C2-83444F01C798}"/>
+              </a:ext>
+            </a:extLst>
+          </p:cNvPr>
+          <p:cNvCxnSpPr>
+            <a:cxnSpLocks/>
+          </p:cNvCxnSpPr>
+          <p:nvPr/>
+        </p:nvCxnSpPr>
+        <p:spPr>
+          <a:xfrm>
+            <a:off x="8408893" y="690282"/>
+            <a:ext cx="0" cy="964291"/>
+          </a:xfrm>
+          <a:prstGeom prst="straightConnector1">
+            <a:avLst/>
+          </a:prstGeom>
+          <a:ln>
+            <a:tailEnd type="triangle"/>
+          </a:ln>
+        </p:spPr>
+        <p:style>
+          <a:lnRef idx="1">
+            <a:schemeClr val="dk1"/>
+          </a:lnRef>
+          <a:fillRef idx="0">
+            <a:schemeClr val="dk1"/>
+          </a:fillRef>
+          <a:effectRef idx="0">
+            <a:schemeClr val="dk1"/>
+          </a:effectRef>
+          <a:fontRef idx="minor">
+            <a:schemeClr val="tx1"/>
+          </a:fontRef>
+        </p:style>
+      </p:cxnSp>
+      <p:sp>
+        <p:nvSpPr>
+          <p:cNvPr id="6" name="TextBox 5">
+            <a:extLst>
+              <a:ext uri="{FF2B5EF4-FFF2-40B4-BE49-F238E27FC236}">
+                <a16:creationId xmlns:a16="http://schemas.microsoft.com/office/drawing/2014/main" id="{AE282EC0-FBE9-517C-B775-96EA60D069BE}"/>
+              </a:ext>
+            </a:extLst>
+          </p:cNvPr>
+          <p:cNvSpPr txBox="1"/>
+          <p:nvPr/>
+        </p:nvSpPr>
+        <p:spPr>
+          <a:xfrm>
+            <a:off x="21551" y="774252"/>
+            <a:ext cx="3655963" cy="369332"/>
+          </a:xfrm>
+          <a:prstGeom prst="rect">
+            <a:avLst/>
+          </a:prstGeom>
+          <a:noFill/>
+        </p:spPr>
+        <p:txBody>
+          <a:bodyPr wrap="square" rtlCol="0">
+            <a:spAutoFit/>
+          </a:bodyPr>
+          <a:lstStyle/>
+          <a:p>
+            <a:pPr algn="ctr"/>
+            <a:r>
+              <a:rPr lang="en-US" dirty="0"/>
+              <a:t>Slide on main body mounts</a:t>
+            </a:r>
+          </a:p>
+        </p:txBody>
+      </p:sp>
+    </p:spTree>
+    <p:extLst>
+      <p:ext uri="{BB962C8B-B14F-4D97-AF65-F5344CB8AC3E}">
+        <p14:creationId xmlns:p14="http://schemas.microsoft.com/office/powerpoint/2010/main" val="3030264259"/>
+      </p:ext>
+    </p:extLst>
+  </p:cSld>
+  <p:clrMapOvr>
+    <a:masterClrMapping/>
+  </p:clrMapOvr>
+</p:sld>
+</file>
+
+<file path=ppt/slides/slide19.xml><?xml version="1.0" encoding="utf-8"?>
+<p:sld xmlns:a="http://schemas.openxmlformats.org/drawingml/2006/main" xmlns:r="http://schemas.openxmlformats.org/officeDocument/2006/relationships" xmlns:p="http://schemas.openxmlformats.org/presentationml/2006/main">
+  <p:cSld>
+    <p:spTree>
+      <p:nvGrpSpPr>
+        <p:cNvPr id="1" name="">
+          <a:extLst>
+            <a:ext uri="{FF2B5EF4-FFF2-40B4-BE49-F238E27FC236}">
+              <a16:creationId xmlns:a16="http://schemas.microsoft.com/office/drawing/2014/main" id="{0F4D41B3-D8BE-CBFD-B641-BF8556DF0739}"/>
+            </a:ext>
+          </a:extLst>
+        </p:cNvPr>
+        <p:cNvGrpSpPr/>
+        <p:nvPr/>
+      </p:nvGrpSpPr>
+      <p:grpSpPr>
+        <a:xfrm>
+          <a:off x="0" y="0"/>
+          <a:ext cx="0" cy="0"/>
+          <a:chOff x="0" y="0"/>
+          <a:chExt cx="0" cy="0"/>
+        </a:xfrm>
+      </p:grpSpPr>
+      <p:pic>
+        <p:nvPicPr>
+          <p:cNvPr id="13" name="Picture 12">
+            <a:extLst>
+              <a:ext uri="{FF2B5EF4-FFF2-40B4-BE49-F238E27FC236}">
+                <a16:creationId xmlns:a16="http://schemas.microsoft.com/office/drawing/2014/main" id="{1C728B8B-8A9D-1007-B2E6-1C8BB37C08AD}"/>
+              </a:ext>
+            </a:extLst>
+          </p:cNvPr>
+          <p:cNvPicPr>
+            <a:picLocks noChangeAspect="1"/>
+          </p:cNvPicPr>
+          <p:nvPr/>
+        </p:nvPicPr>
+        <p:blipFill>
+          <a:blip r:embed="rId3"/>
+          <a:stretch>
+            <a:fillRect/>
+          </a:stretch>
+        </p:blipFill>
+        <p:spPr>
+          <a:xfrm>
+            <a:off x="21551" y="15125"/>
+            <a:ext cx="12192000" cy="6858000"/>
+          </a:xfrm>
+          <a:prstGeom prst="rect">
+            <a:avLst/>
+          </a:prstGeom>
+        </p:spPr>
+      </p:pic>
+      <p:sp>
+        <p:nvSpPr>
+          <p:cNvPr id="6" name="TextBox 5">
+            <a:extLst>
+              <a:ext uri="{FF2B5EF4-FFF2-40B4-BE49-F238E27FC236}">
+                <a16:creationId xmlns:a16="http://schemas.microsoft.com/office/drawing/2014/main" id="{067B2A41-E757-8DF2-C3DA-8DDF7E0BAB55}"/>
+              </a:ext>
+            </a:extLst>
+          </p:cNvPr>
+          <p:cNvSpPr txBox="1"/>
+          <p:nvPr/>
+        </p:nvSpPr>
+        <p:spPr>
+          <a:xfrm>
+            <a:off x="21551" y="774252"/>
+            <a:ext cx="3655963" cy="923330"/>
+          </a:xfrm>
+          <a:prstGeom prst="rect">
+            <a:avLst/>
+          </a:prstGeom>
+          <a:noFill/>
+        </p:spPr>
+        <p:txBody>
+          <a:bodyPr wrap="square" rtlCol="0">
+            <a:spAutoFit/>
+          </a:bodyPr>
+          <a:lstStyle/>
+          <a:p>
+            <a:pPr algn="ctr"/>
+            <a:r>
+              <a:rPr lang="en-US" dirty="0"/>
+              <a:t>Rotate entire assembly into place</a:t>
+            </a:r>
+          </a:p>
+          <a:p>
+            <a:pPr algn="ctr"/>
+            <a:endParaRPr lang="en-US" dirty="0"/>
+          </a:p>
+          <a:p>
+            <a:pPr algn="ctr"/>
+            <a:r>
+              <a:rPr lang="en-US" dirty="0"/>
+              <a:t>Secure sides with m4*10 screws</a:t>
+            </a:r>
+          </a:p>
+        </p:txBody>
+      </p:sp>
+      <p:pic>
+        <p:nvPicPr>
+          <p:cNvPr id="4" name="Picture 3">
+            <a:extLst>
+              <a:ext uri="{FF2B5EF4-FFF2-40B4-BE49-F238E27FC236}">
+                <a16:creationId xmlns:a16="http://schemas.microsoft.com/office/drawing/2014/main" id="{DC0D830D-2CF2-61EC-23D6-53D7B333A0D2}"/>
+              </a:ext>
+            </a:extLst>
+          </p:cNvPr>
+          <p:cNvPicPr>
+            <a:picLocks noChangeAspect="1"/>
+          </p:cNvPicPr>
+          <p:nvPr/>
+        </p:nvPicPr>
+        <p:blipFill>
+          <a:blip r:embed="rId4"/>
+          <a:stretch>
+            <a:fillRect/>
+          </a:stretch>
+        </p:blipFill>
+        <p:spPr>
+          <a:xfrm>
+            <a:off x="4427153" y="15125"/>
+            <a:ext cx="6547058" cy="6858000"/>
+          </a:xfrm>
+          <a:prstGeom prst="rect">
+            <a:avLst/>
+          </a:prstGeom>
+        </p:spPr>
+      </p:pic>
+    </p:spTree>
+    <p:extLst>
+      <p:ext uri="{BB962C8B-B14F-4D97-AF65-F5344CB8AC3E}">
+        <p14:creationId xmlns:p14="http://schemas.microsoft.com/office/powerpoint/2010/main" val="3466219972"/>
       </p:ext>
     </p:extLst>
   </p:cSld>
@@ -7382,6 +9432,417 @@
     <p:extLst>
       <p:ext uri="{BB962C8B-B14F-4D97-AF65-F5344CB8AC3E}">
         <p14:creationId xmlns:p14="http://schemas.microsoft.com/office/powerpoint/2010/main" val="993230337"/>
+      </p:ext>
+    </p:extLst>
+  </p:cSld>
+  <p:clrMapOvr>
+    <a:masterClrMapping/>
+  </p:clrMapOvr>
+</p:sld>
+</file>
+
+<file path=ppt/slides/slide20.xml><?xml version="1.0" encoding="utf-8"?>
+<p:sld xmlns:a="http://schemas.openxmlformats.org/drawingml/2006/main" xmlns:r="http://schemas.openxmlformats.org/officeDocument/2006/relationships" xmlns:p="http://schemas.openxmlformats.org/presentationml/2006/main">
+  <p:cSld>
+    <p:spTree>
+      <p:nvGrpSpPr>
+        <p:cNvPr id="1" name="">
+          <a:extLst>
+            <a:ext uri="{FF2B5EF4-FFF2-40B4-BE49-F238E27FC236}">
+              <a16:creationId xmlns:a16="http://schemas.microsoft.com/office/drawing/2014/main" id="{F2B3B6B6-7391-BC38-E97C-9FC4470FE529}"/>
+            </a:ext>
+          </a:extLst>
+        </p:cNvPr>
+        <p:cNvGrpSpPr/>
+        <p:nvPr/>
+      </p:nvGrpSpPr>
+      <p:grpSpPr>
+        <a:xfrm>
+          <a:off x="0" y="0"/>
+          <a:ext cx="0" cy="0"/>
+          <a:chOff x="0" y="0"/>
+          <a:chExt cx="0" cy="0"/>
+        </a:xfrm>
+      </p:grpSpPr>
+      <p:pic>
+        <p:nvPicPr>
+          <p:cNvPr id="13" name="Picture 12">
+            <a:extLst>
+              <a:ext uri="{FF2B5EF4-FFF2-40B4-BE49-F238E27FC236}">
+                <a16:creationId xmlns:a16="http://schemas.microsoft.com/office/drawing/2014/main" id="{BDAD41C5-FCE9-836B-0832-BCFE1450E9C8}"/>
+              </a:ext>
+            </a:extLst>
+          </p:cNvPr>
+          <p:cNvPicPr>
+            <a:picLocks noChangeAspect="1"/>
+          </p:cNvPicPr>
+          <p:nvPr/>
+        </p:nvPicPr>
+        <p:blipFill>
+          <a:blip r:embed="rId3"/>
+          <a:stretch>
+            <a:fillRect/>
+          </a:stretch>
+        </p:blipFill>
+        <p:spPr>
+          <a:xfrm>
+            <a:off x="21551" y="15125"/>
+            <a:ext cx="12192000" cy="6858000"/>
+          </a:xfrm>
+          <a:prstGeom prst="rect">
+            <a:avLst/>
+          </a:prstGeom>
+        </p:spPr>
+      </p:pic>
+      <p:sp>
+        <p:nvSpPr>
+          <p:cNvPr id="6" name="TextBox 5">
+            <a:extLst>
+              <a:ext uri="{FF2B5EF4-FFF2-40B4-BE49-F238E27FC236}">
+                <a16:creationId xmlns:a16="http://schemas.microsoft.com/office/drawing/2014/main" id="{3B9F01EE-BA77-B6A9-A3FF-6587E4DA67DB}"/>
+              </a:ext>
+            </a:extLst>
+          </p:cNvPr>
+          <p:cNvSpPr txBox="1"/>
+          <p:nvPr/>
+        </p:nvSpPr>
+        <p:spPr>
+          <a:xfrm>
+            <a:off x="21551" y="774252"/>
+            <a:ext cx="3655963" cy="646331"/>
+          </a:xfrm>
+          <a:prstGeom prst="rect">
+            <a:avLst/>
+          </a:prstGeom>
+          <a:noFill/>
+        </p:spPr>
+        <p:txBody>
+          <a:bodyPr wrap="square" rtlCol="0">
+            <a:spAutoFit/>
+          </a:bodyPr>
+          <a:lstStyle/>
+          <a:p>
+            <a:pPr algn="ctr"/>
+            <a:r>
+              <a:rPr lang="en-US" dirty="0"/>
+              <a:t>Slide Arm assembly up and attach</a:t>
+            </a:r>
+          </a:p>
+          <a:p>
+            <a:pPr algn="ctr"/>
+            <a:r>
+              <a:rPr lang="en-US" dirty="0"/>
+              <a:t>Center servo bracket.</a:t>
+            </a:r>
+          </a:p>
+        </p:txBody>
+      </p:sp>
+      <p:pic>
+        <p:nvPicPr>
+          <p:cNvPr id="3" name="Picture 2">
+            <a:extLst>
+              <a:ext uri="{FF2B5EF4-FFF2-40B4-BE49-F238E27FC236}">
+                <a16:creationId xmlns:a16="http://schemas.microsoft.com/office/drawing/2014/main" id="{AB9147B0-C4AA-68A0-559A-7F63856CF1F7}"/>
+              </a:ext>
+            </a:extLst>
+          </p:cNvPr>
+          <p:cNvPicPr>
+            <a:picLocks noChangeAspect="1"/>
+          </p:cNvPicPr>
+          <p:nvPr/>
+        </p:nvPicPr>
+        <p:blipFill>
+          <a:blip r:embed="rId4"/>
+          <a:stretch>
+            <a:fillRect/>
+          </a:stretch>
+        </p:blipFill>
+        <p:spPr>
+          <a:xfrm>
+            <a:off x="3805245" y="0"/>
+            <a:ext cx="7916380" cy="6487430"/>
+          </a:xfrm>
+          <a:prstGeom prst="rect">
+            <a:avLst/>
+          </a:prstGeom>
+        </p:spPr>
+      </p:pic>
+      <p:cxnSp>
+        <p:nvCxnSpPr>
+          <p:cNvPr id="5" name="Straight Arrow Connector 4">
+            <a:extLst>
+              <a:ext uri="{FF2B5EF4-FFF2-40B4-BE49-F238E27FC236}">
+                <a16:creationId xmlns:a16="http://schemas.microsoft.com/office/drawing/2014/main" id="{501A8F98-C99D-83E1-9144-EB50894AF773}"/>
+              </a:ext>
+            </a:extLst>
+          </p:cNvPr>
+          <p:cNvCxnSpPr>
+            <a:cxnSpLocks/>
+          </p:cNvCxnSpPr>
+          <p:nvPr/>
+        </p:nvCxnSpPr>
+        <p:spPr>
+          <a:xfrm flipH="1">
+            <a:off x="8157881" y="1595718"/>
+            <a:ext cx="1532966" cy="1009114"/>
+          </a:xfrm>
+          <a:prstGeom prst="straightConnector1">
+            <a:avLst/>
+          </a:prstGeom>
+          <a:ln>
+            <a:tailEnd type="triangle"/>
+          </a:ln>
+        </p:spPr>
+        <p:style>
+          <a:lnRef idx="1">
+            <a:schemeClr val="dk1"/>
+          </a:lnRef>
+          <a:fillRef idx="0">
+            <a:schemeClr val="dk1"/>
+          </a:fillRef>
+          <a:effectRef idx="0">
+            <a:schemeClr val="dk1"/>
+          </a:effectRef>
+          <a:fontRef idx="minor">
+            <a:schemeClr val="tx1"/>
+          </a:fontRef>
+        </p:style>
+      </p:cxnSp>
+      <p:cxnSp>
+        <p:nvCxnSpPr>
+          <p:cNvPr id="9" name="Straight Arrow Connector 8">
+            <a:extLst>
+              <a:ext uri="{FF2B5EF4-FFF2-40B4-BE49-F238E27FC236}">
+                <a16:creationId xmlns:a16="http://schemas.microsoft.com/office/drawing/2014/main" id="{1B2DC106-05D2-1FF6-1B9C-E77F4661E1E5}"/>
+              </a:ext>
+            </a:extLst>
+          </p:cNvPr>
+          <p:cNvCxnSpPr>
+            <a:cxnSpLocks/>
+          </p:cNvCxnSpPr>
+          <p:nvPr/>
+        </p:nvCxnSpPr>
+        <p:spPr>
+          <a:xfrm flipH="1">
+            <a:off x="8901953" y="1748118"/>
+            <a:ext cx="941294" cy="1882588"/>
+          </a:xfrm>
+          <a:prstGeom prst="straightConnector1">
+            <a:avLst/>
+          </a:prstGeom>
+          <a:ln>
+            <a:tailEnd type="triangle"/>
+          </a:ln>
+        </p:spPr>
+        <p:style>
+          <a:lnRef idx="1">
+            <a:schemeClr val="dk1"/>
+          </a:lnRef>
+          <a:fillRef idx="0">
+            <a:schemeClr val="dk1"/>
+          </a:fillRef>
+          <a:effectRef idx="0">
+            <a:schemeClr val="dk1"/>
+          </a:effectRef>
+          <a:fontRef idx="minor">
+            <a:schemeClr val="tx1"/>
+          </a:fontRef>
+        </p:style>
+      </p:cxnSp>
+    </p:spTree>
+    <p:extLst>
+      <p:ext uri="{BB962C8B-B14F-4D97-AF65-F5344CB8AC3E}">
+        <p14:creationId xmlns:p14="http://schemas.microsoft.com/office/powerpoint/2010/main" val="1201537915"/>
+      </p:ext>
+    </p:extLst>
+  </p:cSld>
+  <p:clrMapOvr>
+    <a:masterClrMapping/>
+  </p:clrMapOvr>
+</p:sld>
+</file>
+
+<file path=ppt/slides/slide21.xml><?xml version="1.0" encoding="utf-8"?>
+<p:sld xmlns:a="http://schemas.openxmlformats.org/drawingml/2006/main" xmlns:r="http://schemas.openxmlformats.org/officeDocument/2006/relationships" xmlns:p="http://schemas.openxmlformats.org/presentationml/2006/main">
+  <p:cSld>
+    <p:spTree>
+      <p:nvGrpSpPr>
+        <p:cNvPr id="1" name="">
+          <a:extLst>
+            <a:ext uri="{FF2B5EF4-FFF2-40B4-BE49-F238E27FC236}">
+              <a16:creationId xmlns:a16="http://schemas.microsoft.com/office/drawing/2014/main" id="{CEE86E40-7D3B-2458-C30A-E65D8C40DAF0}"/>
+            </a:ext>
+          </a:extLst>
+        </p:cNvPr>
+        <p:cNvGrpSpPr/>
+        <p:nvPr/>
+      </p:nvGrpSpPr>
+      <p:grpSpPr>
+        <a:xfrm>
+          <a:off x="0" y="0"/>
+          <a:ext cx="0" cy="0"/>
+          <a:chOff x="0" y="0"/>
+          <a:chExt cx="0" cy="0"/>
+        </a:xfrm>
+      </p:grpSpPr>
+      <p:pic>
+        <p:nvPicPr>
+          <p:cNvPr id="13" name="Picture 12">
+            <a:extLst>
+              <a:ext uri="{FF2B5EF4-FFF2-40B4-BE49-F238E27FC236}">
+                <a16:creationId xmlns:a16="http://schemas.microsoft.com/office/drawing/2014/main" id="{7C648FAF-4054-16FF-8D61-9F0C58D22440}"/>
+              </a:ext>
+            </a:extLst>
+          </p:cNvPr>
+          <p:cNvPicPr>
+            <a:picLocks noChangeAspect="1"/>
+          </p:cNvPicPr>
+          <p:nvPr/>
+        </p:nvPicPr>
+        <p:blipFill>
+          <a:blip r:embed="rId3"/>
+          <a:stretch>
+            <a:fillRect/>
+          </a:stretch>
+        </p:blipFill>
+        <p:spPr>
+          <a:xfrm>
+            <a:off x="21551" y="0"/>
+            <a:ext cx="12192000" cy="6858000"/>
+          </a:xfrm>
+          <a:prstGeom prst="rect">
+            <a:avLst/>
+          </a:prstGeom>
+        </p:spPr>
+      </p:pic>
+      <p:sp>
+        <p:nvSpPr>
+          <p:cNvPr id="6" name="TextBox 5">
+            <a:extLst>
+              <a:ext uri="{FF2B5EF4-FFF2-40B4-BE49-F238E27FC236}">
+                <a16:creationId xmlns:a16="http://schemas.microsoft.com/office/drawing/2014/main" id="{8D3F45AF-C1D1-834A-DCA6-3EFE25FD1B48}"/>
+              </a:ext>
+            </a:extLst>
+          </p:cNvPr>
+          <p:cNvSpPr txBox="1"/>
+          <p:nvPr/>
+        </p:nvSpPr>
+        <p:spPr>
+          <a:xfrm>
+            <a:off x="21551" y="774252"/>
+            <a:ext cx="3655963" cy="369332"/>
+          </a:xfrm>
+          <a:prstGeom prst="rect">
+            <a:avLst/>
+          </a:prstGeom>
+          <a:noFill/>
+        </p:spPr>
+        <p:txBody>
+          <a:bodyPr wrap="square" rtlCol="0">
+            <a:spAutoFit/>
+          </a:bodyPr>
+          <a:lstStyle/>
+          <a:p>
+            <a:pPr algn="ctr"/>
+            <a:r>
+              <a:rPr lang="en-US" dirty="0"/>
+              <a:t>Each arm is assembly like the picture</a:t>
+            </a:r>
+          </a:p>
+        </p:txBody>
+      </p:sp>
+      <p:pic>
+        <p:nvPicPr>
+          <p:cNvPr id="4" name="Picture 3">
+            <a:extLst>
+              <a:ext uri="{FF2B5EF4-FFF2-40B4-BE49-F238E27FC236}">
+                <a16:creationId xmlns:a16="http://schemas.microsoft.com/office/drawing/2014/main" id="{CEA1D5E7-80F4-2214-933E-4C3915AF370B}"/>
+              </a:ext>
+            </a:extLst>
+          </p:cNvPr>
+          <p:cNvPicPr>
+            <a:picLocks noChangeAspect="1"/>
+          </p:cNvPicPr>
+          <p:nvPr/>
+        </p:nvPicPr>
+        <p:blipFill>
+          <a:blip r:embed="rId4"/>
+          <a:stretch>
+            <a:fillRect/>
+          </a:stretch>
+        </p:blipFill>
+        <p:spPr>
+          <a:xfrm>
+            <a:off x="5444871" y="161469"/>
+            <a:ext cx="5001323" cy="6535062"/>
+          </a:xfrm>
+          <a:prstGeom prst="rect">
+            <a:avLst/>
+          </a:prstGeom>
+        </p:spPr>
+      </p:pic>
+      <p:sp>
+        <p:nvSpPr>
+          <p:cNvPr id="7" name="Rectangle 6">
+            <a:extLst>
+              <a:ext uri="{FF2B5EF4-FFF2-40B4-BE49-F238E27FC236}">
+                <a16:creationId xmlns:a16="http://schemas.microsoft.com/office/drawing/2014/main" id="{80A35CC3-9497-8160-C0B5-471E69C0F393}"/>
+              </a:ext>
+            </a:extLst>
+          </p:cNvPr>
+          <p:cNvSpPr/>
+          <p:nvPr/>
+        </p:nvSpPr>
+        <p:spPr>
+          <a:xfrm>
+            <a:off x="53759" y="-124391"/>
+            <a:ext cx="835485" cy="923330"/>
+          </a:xfrm>
+          <a:prstGeom prst="rect">
+            <a:avLst/>
+          </a:prstGeom>
+          <a:noFill/>
+        </p:spPr>
+        <p:txBody>
+          <a:bodyPr wrap="none" lIns="91440" tIns="45720" rIns="91440" bIns="45720">
+            <a:spAutoFit/>
+          </a:bodyPr>
+          <a:lstStyle/>
+          <a:p>
+            <a:pPr algn="ctr"/>
+            <a:r>
+              <a:rPr lang="en-US" sz="5400" dirty="0">
+                <a:ln w="0"/>
+                <a:effectLst>
+                  <a:outerShdw blurRad="38100" dist="19050" dir="2700000" algn="tl" rotWithShape="0">
+                    <a:schemeClr val="dk1">
+                      <a:alpha val="40000"/>
+                    </a:schemeClr>
+                  </a:outerShdw>
+                </a:effectLst>
+              </a:rPr>
+              <a:t>x2</a:t>
+            </a:r>
+            <a:endParaRPr lang="en-US" sz="5400" b="0" cap="none" spc="0" dirty="0">
+              <a:ln w="0"/>
+              <a:solidFill>
+                <a:schemeClr val="tx1"/>
+              </a:solidFill>
+              <a:effectLst>
+                <a:outerShdw blurRad="38100" dist="19050" dir="2700000" algn="tl" rotWithShape="0">
+                  <a:schemeClr val="dk1">
+                    <a:alpha val="40000"/>
+                  </a:schemeClr>
+                </a:outerShdw>
+              </a:effectLst>
+            </a:endParaRPr>
+          </a:p>
+        </p:txBody>
+      </p:sp>
+    </p:spTree>
+    <p:extLst>
+      <p:ext uri="{BB962C8B-B14F-4D97-AF65-F5344CB8AC3E}">
+        <p14:creationId xmlns:p14="http://schemas.microsoft.com/office/powerpoint/2010/main" val="3754979084"/>
       </p:ext>
     </p:extLst>
   </p:cSld>

</xml_diff>